<commit_message>
updated power point and code
</commit_message>
<xml_diff>
--- a/Project Starfighter 1.0.pptx
+++ b/Project Starfighter 1.0.pptx
@@ -23,22 +23,20 @@
     <p:sldId id="276" r:id="rId17"/>
     <p:sldId id="275" r:id="rId18"/>
     <p:sldId id="277" r:id="rId19"/>
-    <p:sldId id="278" r:id="rId20"/>
-    <p:sldId id="280" r:id="rId21"/>
-    <p:sldId id="281" r:id="rId22"/>
-    <p:sldId id="284" r:id="rId23"/>
-    <p:sldId id="282" r:id="rId24"/>
-    <p:sldId id="283" r:id="rId25"/>
-    <p:sldId id="285" r:id="rId26"/>
-    <p:sldId id="286" r:id="rId27"/>
-    <p:sldId id="287" r:id="rId28"/>
-    <p:sldId id="288" r:id="rId29"/>
-    <p:sldId id="289" r:id="rId30"/>
-    <p:sldId id="290" r:id="rId31"/>
-    <p:sldId id="269" r:id="rId32"/>
-    <p:sldId id="270" r:id="rId33"/>
-    <p:sldId id="271" r:id="rId34"/>
-    <p:sldId id="272" r:id="rId35"/>
+    <p:sldId id="280" r:id="rId20"/>
+    <p:sldId id="281" r:id="rId21"/>
+    <p:sldId id="284" r:id="rId22"/>
+    <p:sldId id="282" r:id="rId23"/>
+    <p:sldId id="283" r:id="rId24"/>
+    <p:sldId id="285" r:id="rId25"/>
+    <p:sldId id="286" r:id="rId26"/>
+    <p:sldId id="287" r:id="rId27"/>
+    <p:sldId id="288" r:id="rId28"/>
+    <p:sldId id="289" r:id="rId29"/>
+    <p:sldId id="269" r:id="rId30"/>
+    <p:sldId id="270" r:id="rId31"/>
+    <p:sldId id="271" r:id="rId32"/>
+    <p:sldId id="272" r:id="rId33"/>
   </p:sldIdLst>
   <p:sldSz cx="9144000" cy="6858000" type="screen4x3"/>
   <p:notesSz cx="6858000" cy="9144000"/>
@@ -4961,12 +4959,12 @@
           <a:lstStyle/>
           <a:p>
             <a:r>
-              <a:rPr lang="en-US" dirty="0" err="1"/>
-              <a:t>AnimatedSprite</a:t>
+              <a:rPr lang="en-US" dirty="0" smtClean="0"/>
+              <a:t>Background </a:t>
             </a:r>
             <a:r>
               <a:rPr lang="en-US" dirty="0"/>
-              <a:t> Test Code</a:t>
+              <a:t>Test Code</a:t>
             </a:r>
           </a:p>
         </p:txBody>
@@ -4987,142 +4985,102 @@
           <a:lstStyle/>
           <a:p>
             <a:r>
-              <a:rPr lang="en-US" sz="1800" dirty="0"/>
-              <a:t> [</a:t>
-            </a:r>
-            <a:r>
-              <a:rPr lang="en-US" sz="1800" dirty="0" err="1"/>
-              <a:t>TestMethod</a:t>
-            </a:r>
-            <a:r>
-              <a:rPr lang="en-US" sz="1800" dirty="0"/>
-              <a:t>]</a:t>
-            </a:r>
-          </a:p>
-          <a:p>
-            <a:r>
-              <a:rPr lang="en-US" sz="1800" dirty="0"/>
-              <a:t>        public void </a:t>
-            </a:r>
-            <a:r>
-              <a:rPr lang="en-US" sz="1800" dirty="0" err="1"/>
-              <a:t>Update_Test</a:t>
-            </a:r>
-            <a:r>
-              <a:rPr lang="en-US" sz="1800" dirty="0"/>
-              <a:t>()</a:t>
-            </a:r>
-          </a:p>
-          <a:p>
-            <a:r>
-              <a:rPr lang="en-US" sz="1800" dirty="0"/>
-              <a:t>        {</a:t>
-            </a:r>
-          </a:p>
-          <a:p>
-            <a:r>
-              <a:rPr lang="en-US" sz="1800" dirty="0"/>
-              <a:t>            </a:t>
-            </a:r>
-            <a:r>
-              <a:rPr lang="en-US" sz="1800" dirty="0" err="1"/>
-              <a:t>animatedSprite.IsAnimating</a:t>
-            </a:r>
-            <a:r>
-              <a:rPr lang="en-US" sz="1800" dirty="0"/>
-              <a:t> = true;</a:t>
-            </a:r>
-          </a:p>
-          <a:p>
-            <a:r>
-              <a:rPr lang="en-US" sz="1800" dirty="0"/>
-              <a:t>            </a:t>
-            </a:r>
-            <a:r>
-              <a:rPr lang="en-US" sz="1800" dirty="0" err="1"/>
-              <a:t>animatedSprite.Elapsed</a:t>
-            </a:r>
-            <a:r>
-              <a:rPr lang="en-US" sz="1800" dirty="0"/>
-              <a:t> = 1;</a:t>
-            </a:r>
-          </a:p>
-          <a:p>
-            <a:r>
-              <a:rPr lang="en-US" sz="1800" dirty="0"/>
-              <a:t>            </a:t>
-            </a:r>
-            <a:r>
-              <a:rPr lang="en-US" sz="1800" dirty="0" err="1"/>
-              <a:t>animatedSprite.Frame</a:t>
-            </a:r>
-            <a:r>
-              <a:rPr lang="en-US" sz="1800" dirty="0"/>
-              <a:t> = 2;</a:t>
-            </a:r>
-          </a:p>
-          <a:p>
-            <a:r>
-              <a:rPr lang="en-US" sz="1800" dirty="0"/>
-              <a:t>            </a:t>
-            </a:r>
-            <a:r>
-              <a:rPr lang="en-US" sz="1800" dirty="0" err="1"/>
-              <a:t>animatedSprite.Update</a:t>
-            </a:r>
-            <a:r>
-              <a:rPr lang="en-US" sz="1800" dirty="0"/>
-              <a:t>(</a:t>
-            </a:r>
-            <a:r>
-              <a:rPr lang="en-US" sz="1800" dirty="0" err="1"/>
-              <a:t>gameTime</a:t>
-            </a:r>
-            <a:r>
-              <a:rPr lang="en-US" sz="1800" dirty="0"/>
-              <a:t>);</a:t>
-            </a:r>
-          </a:p>
-          <a:p>
-            <a:r>
-              <a:rPr lang="en-US" sz="1800" dirty="0"/>
-              <a:t>            </a:t>
-            </a:r>
-            <a:r>
-              <a:rPr lang="en-US" sz="1800" dirty="0" err="1"/>
-              <a:t>Assert.IsTrue</a:t>
-            </a:r>
-            <a:r>
-              <a:rPr lang="en-US" sz="1800" dirty="0"/>
-              <a:t>(3 == </a:t>
-            </a:r>
-            <a:r>
-              <a:rPr lang="en-US" sz="1800" dirty="0" err="1"/>
-              <a:t>animatedSprite.Frame</a:t>
-            </a:r>
-            <a:r>
-              <a:rPr lang="en-US" sz="1800" dirty="0"/>
-              <a:t>);</a:t>
-            </a:r>
-          </a:p>
-          <a:p>
-            <a:endParaRPr lang="en-US" sz="1800" dirty="0"/>
-          </a:p>
-          <a:p>
-            <a:r>
-              <a:rPr lang="en-US" sz="1800" dirty="0"/>
-              <a:t>        </a:t>
-            </a:r>
-            <a:r>
-              <a:rPr lang="en-US" sz="1800" dirty="0" smtClean="0"/>
-              <a:t>}</a:t>
-            </a:r>
-          </a:p>
-          <a:p>
-            <a:r>
-              <a:rPr lang="en-US" sz="1800" dirty="0"/>
-              <a:t>}</a:t>
-            </a:r>
+              <a:rPr lang="en-US" sz="2000" dirty="0"/>
+              <a:t>using System;</a:t>
+            </a:r>
+          </a:p>
+          <a:p>
+            <a:r>
+              <a:rPr lang="en-US" sz="2000" dirty="0"/>
+              <a:t>using </a:t>
+            </a:r>
+            <a:r>
+              <a:rPr lang="en-US" sz="2000" dirty="0" err="1"/>
+              <a:t>System.Text</a:t>
+            </a:r>
+            <a:r>
+              <a:rPr lang="en-US" sz="2000" dirty="0"/>
+              <a:t>;</a:t>
+            </a:r>
+          </a:p>
+          <a:p>
+            <a:r>
+              <a:rPr lang="en-US" sz="2000" dirty="0"/>
+              <a:t>using </a:t>
+            </a:r>
+            <a:r>
+              <a:rPr lang="en-US" sz="2000" dirty="0" err="1"/>
+              <a:t>System.Collections.Generic</a:t>
+            </a:r>
+            <a:r>
+              <a:rPr lang="en-US" sz="2000" dirty="0"/>
+              <a:t>;</a:t>
+            </a:r>
+          </a:p>
+          <a:p>
+            <a:r>
+              <a:rPr lang="en-US" sz="2000" dirty="0"/>
+              <a:t>using </a:t>
+            </a:r>
+            <a:r>
+              <a:rPr lang="en-US" sz="2000" dirty="0" err="1"/>
+              <a:t>System.Linq</a:t>
+            </a:r>
+            <a:r>
+              <a:rPr lang="en-US" sz="2000" dirty="0"/>
+              <a:t>;</a:t>
+            </a:r>
+          </a:p>
+          <a:p>
+            <a:r>
+              <a:rPr lang="en-US" sz="2000" dirty="0"/>
+              <a:t>using </a:t>
+            </a:r>
+            <a:r>
+              <a:rPr lang="en-US" sz="2000" dirty="0" err="1"/>
+              <a:t>Microsoft.VisualStudio.TestTools.UnitTesting</a:t>
+            </a:r>
+            <a:r>
+              <a:rPr lang="en-US" sz="2000" dirty="0"/>
+              <a:t>;</a:t>
+            </a:r>
+          </a:p>
+          <a:p>
+            <a:r>
+              <a:rPr lang="en-US" sz="2000" dirty="0"/>
+              <a:t>using </a:t>
+            </a:r>
+            <a:r>
+              <a:rPr lang="en-US" sz="2000" dirty="0" err="1"/>
+              <a:t>Project_Starfighter</a:t>
+            </a:r>
+            <a:r>
+              <a:rPr lang="en-US" sz="2000" dirty="0"/>
+              <a:t>;</a:t>
+            </a:r>
+          </a:p>
+          <a:p>
+            <a:endParaRPr lang="en-US" sz="2000" dirty="0"/>
+          </a:p>
+          <a:p>
+            <a:r>
+              <a:rPr lang="en-US" sz="2000" dirty="0"/>
+              <a:t>namespace </a:t>
+            </a:r>
+            <a:r>
+              <a:rPr lang="en-US" sz="2000" dirty="0" err="1"/>
+              <a:t>Project_Starfighter_Test</a:t>
+            </a:r>
+            <a:endParaRPr lang="en-US" sz="2000" dirty="0"/>
+          </a:p>
+          <a:p>
+            <a:r>
+              <a:rPr lang="en-US" sz="2000" dirty="0" smtClean="0"/>
+              <a:t>{</a:t>
+            </a:r>
+          </a:p>
+          <a:p>
+            <a:endParaRPr lang="en-US" sz="1800" dirty="0" smtClean="0"/>
           </a:p>
           <a:p>
             <a:pPr marL="0" indent="0">
@@ -5135,7 +5093,7 @@
     </p:spTree>
     <p:extLst>
       <p:ext uri="{BB962C8B-B14F-4D97-AF65-F5344CB8AC3E}">
-        <p14:creationId xmlns:p14="http://schemas.microsoft.com/office/powerpoint/2010/main" val="3772113046"/>
+        <p14:creationId xmlns:p14="http://schemas.microsoft.com/office/powerpoint/2010/main" val="897719000"/>
       </p:ext>
     </p:extLst>
   </p:cSld>
@@ -5295,17 +5253,42 @@
           <a:p>
             <a:r>
               <a:rPr lang="en-US" sz="2000" dirty="0"/>
-              <a:t>using System;</a:t>
-            </a:r>
-          </a:p>
-          <a:p>
+              <a:t> [</a:t>
+            </a:r>
+            <a:r>
+              <a:rPr lang="en-US" sz="2000" dirty="0" err="1"/>
+              <a:t>TestClass</a:t>
+            </a:r>
             <a:r>
               <a:rPr lang="en-US" sz="2000" dirty="0"/>
-              <a:t>using </a:t>
+              <a:t>]</a:t>
+            </a:r>
+          </a:p>
+          <a:p>
+            <a:r>
+              <a:rPr lang="en-US" sz="2000" dirty="0"/>
+              <a:t>    public class </a:t>
             </a:r>
             <a:r>
               <a:rPr lang="en-US" sz="2000" dirty="0" err="1"/>
-              <a:t>System.Text</a:t>
+              <a:t>Background_Test</a:t>
+            </a:r>
+            <a:endParaRPr lang="en-US" sz="2000" dirty="0"/>
+          </a:p>
+          <a:p>
+            <a:r>
+              <a:rPr lang="en-US" sz="2000" dirty="0"/>
+              <a:t>    {</a:t>
+            </a:r>
+          </a:p>
+          <a:p>
+            <a:r>
+              <a:rPr lang="en-US" sz="2000" dirty="0"/>
+              <a:t>        Background </a:t>
+            </a:r>
+            <a:r>
+              <a:rPr lang="en-US" sz="2000" dirty="0" err="1"/>
+              <a:t>background</a:t>
             </a:r>
             <a:r>
               <a:rPr lang="en-US" sz="2000" dirty="0"/>
@@ -5315,94 +5298,47 @@
           <a:p>
             <a:r>
               <a:rPr lang="en-US" sz="2000" dirty="0"/>
-              <a:t>using </a:t>
+              <a:t>        public </a:t>
             </a:r>
             <a:r>
               <a:rPr lang="en-US" sz="2000" dirty="0" err="1"/>
-              <a:t>System.Collections.Generic</a:t>
+              <a:t>Background_Test</a:t>
             </a:r>
             <a:r>
               <a:rPr lang="en-US" sz="2000" dirty="0"/>
-              <a:t>;</a:t>
+              <a:t>()</a:t>
             </a:r>
           </a:p>
           <a:p>
             <a:r>
               <a:rPr lang="en-US" sz="2000" dirty="0"/>
-              <a:t>using </a:t>
-            </a:r>
-            <a:r>
-              <a:rPr lang="en-US" sz="2000" dirty="0" err="1"/>
-              <a:t>System.Linq</a:t>
-            </a:r>
+              <a:t>        {</a:t>
+            </a:r>
+          </a:p>
+          <a:p>
             <a:r>
               <a:rPr lang="en-US" sz="2000" dirty="0"/>
-              <a:t>;</a:t>
+              <a:t>            background = new Background();</a:t>
             </a:r>
           </a:p>
           <a:p>
             <a:r>
               <a:rPr lang="en-US" sz="2000" dirty="0"/>
-              <a:t>using </a:t>
-            </a:r>
-            <a:r>
-              <a:rPr lang="en-US" sz="2000" dirty="0" err="1"/>
-              <a:t>Microsoft.VisualStudio.TestTools.UnitTesting</a:t>
-            </a:r>
-            <a:r>
-              <a:rPr lang="en-US" sz="2000" dirty="0"/>
-              <a:t>;</a:t>
-            </a:r>
-          </a:p>
-          <a:p>
-            <a:r>
-              <a:rPr lang="en-US" sz="2000" dirty="0"/>
-              <a:t>using </a:t>
-            </a:r>
-            <a:r>
-              <a:rPr lang="en-US" sz="2000" dirty="0" err="1"/>
-              <a:t>Project_Starfighter</a:t>
-            </a:r>
-            <a:r>
-              <a:rPr lang="en-US" sz="2000" dirty="0"/>
-              <a:t>;</a:t>
-            </a:r>
-          </a:p>
-          <a:p>
-            <a:endParaRPr lang="en-US" sz="2000" dirty="0"/>
-          </a:p>
-          <a:p>
-            <a:r>
-              <a:rPr lang="en-US" sz="2000" dirty="0"/>
-              <a:t>namespace </a:t>
-            </a:r>
-            <a:r>
-              <a:rPr lang="en-US" sz="2000" dirty="0" err="1"/>
-              <a:t>Project_Starfighter_Test</a:t>
-            </a:r>
-            <a:endParaRPr lang="en-US" sz="2000" dirty="0"/>
-          </a:p>
-          <a:p>
-            <a:r>
-              <a:rPr lang="en-US" sz="2000" dirty="0" smtClean="0"/>
-              <a:t>{</a:t>
-            </a:r>
-          </a:p>
-          <a:p>
-            <a:endParaRPr lang="en-US" sz="1800" dirty="0" smtClean="0"/>
+              <a:t>        }</a:t>
+            </a:r>
           </a:p>
           <a:p>
             <a:pPr marL="0" indent="0">
               <a:buNone/>
             </a:pPr>
-            <a:endParaRPr lang="en-US" sz="1800" dirty="0"/>
+            <a:endParaRPr lang="en-US" sz="2000" dirty="0"/>
           </a:p>
         </p:txBody>
       </p:sp>
     </p:spTree>
     <p:extLst>
       <p:ext uri="{BB962C8B-B14F-4D97-AF65-F5344CB8AC3E}">
-        <p14:creationId xmlns:p14="http://schemas.microsoft.com/office/powerpoint/2010/main" val="897719000"/>
+        <p14:creationId xmlns:p14="http://schemas.microsoft.com/office/powerpoint/2010/main" val="755878279"/>
       </p:ext>
     </p:extLst>
   </p:cSld>
@@ -5478,86 +5414,158 @@
           <a:lstStyle/>
           <a:p>
             <a:r>
-              <a:rPr lang="en-US" sz="2000" dirty="0"/>
+              <a:rPr lang="en-US" sz="1800" dirty="0"/>
               <a:t> [</a:t>
             </a:r>
             <a:r>
-              <a:rPr lang="en-US" sz="2000" dirty="0" err="1"/>
-              <a:t>TestClass</a:t>
-            </a:r>
-            <a:r>
-              <a:rPr lang="en-US" sz="2000" dirty="0"/>
+              <a:rPr lang="en-US" sz="1800" dirty="0" err="1"/>
+              <a:t>TestMethod</a:t>
+            </a:r>
+            <a:r>
+              <a:rPr lang="en-US" sz="1800" dirty="0"/>
               <a:t>]</a:t>
             </a:r>
           </a:p>
           <a:p>
             <a:r>
-              <a:rPr lang="en-US" sz="2000" dirty="0"/>
-              <a:t>    public class </a:t>
-            </a:r>
-            <a:r>
-              <a:rPr lang="en-US" sz="2000" dirty="0" err="1"/>
-              <a:t>Background_Test</a:t>
-            </a:r>
-            <a:endParaRPr lang="en-US" sz="2000" dirty="0"/>
-          </a:p>
-          <a:p>
-            <a:r>
-              <a:rPr lang="en-US" sz="2000" dirty="0"/>
-              <a:t>    {</a:t>
-            </a:r>
-          </a:p>
-          <a:p>
-            <a:r>
-              <a:rPr lang="en-US" sz="2000" dirty="0"/>
-              <a:t>        Background </a:t>
-            </a:r>
-            <a:r>
-              <a:rPr lang="en-US" sz="2000" dirty="0" err="1"/>
-              <a:t>background</a:t>
-            </a:r>
-            <a:r>
-              <a:rPr lang="en-US" sz="2000" dirty="0"/>
-              <a:t>;</a:t>
-            </a:r>
-          </a:p>
-          <a:p>
-            <a:r>
-              <a:rPr lang="en-US" sz="2000" dirty="0"/>
-              <a:t>        public </a:t>
-            </a:r>
-            <a:r>
-              <a:rPr lang="en-US" sz="2000" dirty="0" err="1"/>
-              <a:t>Background_Test</a:t>
-            </a:r>
-            <a:r>
-              <a:rPr lang="en-US" sz="2000" dirty="0"/>
+              <a:rPr lang="en-US" sz="1800" dirty="0"/>
+              <a:t>        public void </a:t>
+            </a:r>
+            <a:r>
+              <a:rPr lang="en-US" sz="1800" dirty="0" err="1"/>
+              <a:t>BackgroundOffset_Test</a:t>
+            </a:r>
+            <a:r>
+              <a:rPr lang="en-US" sz="1800" dirty="0"/>
               <a:t>()</a:t>
             </a:r>
           </a:p>
           <a:p>
             <a:r>
-              <a:rPr lang="en-US" sz="2000" dirty="0"/>
+              <a:rPr lang="en-US" sz="1800" dirty="0"/>
               <a:t>        {</a:t>
             </a:r>
           </a:p>
           <a:p>
             <a:r>
-              <a:rPr lang="en-US" sz="2000" dirty="0"/>
-              <a:t>            background = new Background();</a:t>
-            </a:r>
-          </a:p>
-          <a:p>
-            <a:r>
-              <a:rPr lang="en-US" sz="2000" dirty="0"/>
+              <a:rPr lang="en-US" sz="1800" dirty="0"/>
+              <a:t>            </a:t>
+            </a:r>
+            <a:r>
+              <a:rPr lang="en-US" sz="1800" dirty="0" err="1"/>
+              <a:t>background.BackgroundOffset</a:t>
+            </a:r>
+            <a:r>
+              <a:rPr lang="en-US" sz="1800" dirty="0"/>
+              <a:t> = 1;</a:t>
+            </a:r>
+          </a:p>
+          <a:p>
+            <a:r>
+              <a:rPr lang="en-US" sz="1800" dirty="0"/>
+              <a:t>            </a:t>
+            </a:r>
+            <a:r>
+              <a:rPr lang="en-US" sz="1800" dirty="0" err="1"/>
+              <a:t>Assert.IsTrue</a:t>
+            </a:r>
+            <a:r>
+              <a:rPr lang="en-US" sz="1800" dirty="0"/>
+              <a:t>(1 == </a:t>
+            </a:r>
+            <a:r>
+              <a:rPr lang="en-US" sz="1800" dirty="0" err="1"/>
+              <a:t>background.BackgroundOffset</a:t>
+            </a:r>
+            <a:r>
+              <a:rPr lang="en-US" sz="1800" dirty="0"/>
+              <a:t>);</a:t>
+            </a:r>
+          </a:p>
+          <a:p>
+            <a:r>
+              <a:rPr lang="en-US" sz="1800" dirty="0"/>
               <a:t>        }</a:t>
             </a:r>
           </a:p>
           <a:p>
-            <a:pPr marL="0" indent="0">
-              <a:buNone/>
-            </a:pPr>
-            <a:endParaRPr lang="en-US" sz="2000" dirty="0"/>
+            <a:endParaRPr lang="en-US" sz="1800" dirty="0"/>
+          </a:p>
+          <a:p>
+            <a:r>
+              <a:rPr lang="en-US" sz="1800" dirty="0"/>
+              <a:t>        [</a:t>
+            </a:r>
+            <a:r>
+              <a:rPr lang="en-US" sz="1800" dirty="0" err="1"/>
+              <a:t>TestMethod</a:t>
+            </a:r>
+            <a:r>
+              <a:rPr lang="en-US" sz="1800" dirty="0"/>
+              <a:t>]</a:t>
+            </a:r>
+          </a:p>
+          <a:p>
+            <a:r>
+              <a:rPr lang="en-US" sz="1800" dirty="0"/>
+              <a:t>        public void </a:t>
+            </a:r>
+            <a:r>
+              <a:rPr lang="en-US" sz="1800" dirty="0" err="1"/>
+              <a:t>BackgroundWidth_Test</a:t>
+            </a:r>
+            <a:r>
+              <a:rPr lang="en-US" sz="1800" dirty="0"/>
+              <a:t>()</a:t>
+            </a:r>
+          </a:p>
+          <a:p>
+            <a:r>
+              <a:rPr lang="en-US" sz="1800" dirty="0"/>
+              <a:t>        {</a:t>
+            </a:r>
+          </a:p>
+          <a:p>
+            <a:r>
+              <a:rPr lang="en-US" sz="1800" dirty="0"/>
+              <a:t>            </a:t>
+            </a:r>
+            <a:r>
+              <a:rPr lang="en-US" sz="1800" dirty="0" err="1"/>
+              <a:t>background.BackgroundWidth</a:t>
+            </a:r>
+            <a:r>
+              <a:rPr lang="en-US" sz="1800" dirty="0"/>
+              <a:t> = 2;</a:t>
+            </a:r>
+          </a:p>
+          <a:p>
+            <a:r>
+              <a:rPr lang="en-US" sz="1800" dirty="0"/>
+              <a:t>            </a:t>
+            </a:r>
+            <a:r>
+              <a:rPr lang="en-US" sz="1800" dirty="0" err="1"/>
+              <a:t>Assert.IsTrue</a:t>
+            </a:r>
+            <a:r>
+              <a:rPr lang="en-US" sz="1800" dirty="0"/>
+              <a:t>(2 == </a:t>
+            </a:r>
+            <a:r>
+              <a:rPr lang="en-US" sz="1800" dirty="0" err="1"/>
+              <a:t>background.BackgroundWidth</a:t>
+            </a:r>
+            <a:r>
+              <a:rPr lang="en-US" sz="1800" dirty="0"/>
+              <a:t>);</a:t>
+            </a:r>
+          </a:p>
+          <a:p>
+            <a:r>
+              <a:rPr lang="en-US" sz="1800" dirty="0"/>
+              <a:t>        }</a:t>
+            </a:r>
           </a:p>
         </p:txBody>
       </p:sp>
@@ -5659,7 +5667,7 @@
             </a:r>
             <a:r>
               <a:rPr lang="en-US" sz="1800" dirty="0" err="1"/>
-              <a:t>BackgroundOffset_Test</a:t>
+              <a:t>BackgroundHeight_Test</a:t>
             </a:r>
             <a:r>
               <a:rPr lang="en-US" sz="1800" dirty="0"/>
@@ -5679,11 +5687,11 @@
             </a:r>
             <a:r>
               <a:rPr lang="en-US" sz="1800" dirty="0" err="1"/>
-              <a:t>background.BackgroundOffset</a:t>
-            </a:r>
-            <a:r>
-              <a:rPr lang="en-US" sz="1800" dirty="0"/>
-              <a:t> = 1;</a:t>
+              <a:t>background.BackgroundHeight</a:t>
+            </a:r>
+            <a:r>
+              <a:rPr lang="en-US" sz="1800" dirty="0"/>
+              <a:t> = 2;</a:t>
             </a:r>
           </a:p>
           <a:p>
@@ -5697,11 +5705,11 @@
             </a:r>
             <a:r>
               <a:rPr lang="en-US" sz="1800" dirty="0"/>
-              <a:t>(1 == </a:t>
-            </a:r>
-            <a:r>
-              <a:rPr lang="en-US" sz="1800" dirty="0" err="1"/>
-              <a:t>background.BackgroundOffset</a:t>
+              <a:t>(2 == </a:t>
+            </a:r>
+            <a:r>
+              <a:rPr lang="en-US" sz="1800" dirty="0" err="1"/>
+              <a:t>background.BackgroundHeight</a:t>
             </a:r>
             <a:r>
               <a:rPr lang="en-US" sz="1800" dirty="0"/>
@@ -5738,7 +5746,7 @@
             </a:r>
             <a:r>
               <a:rPr lang="en-US" sz="1800" dirty="0" err="1"/>
-              <a:t>BackgroundWidth_Test</a:t>
+              <a:t>BackgroundFileWidth_Test</a:t>
             </a:r>
             <a:r>
               <a:rPr lang="en-US" sz="1800" dirty="0"/>
@@ -5758,11 +5766,11 @@
             </a:r>
             <a:r>
               <a:rPr lang="en-US" sz="1800" dirty="0" err="1"/>
-              <a:t>background.BackgroundWidth</a:t>
-            </a:r>
-            <a:r>
-              <a:rPr lang="en-US" sz="1800" dirty="0"/>
-              <a:t> = 2;</a:t>
+              <a:t>background.BackgroundFileWidth</a:t>
+            </a:r>
+            <a:r>
+              <a:rPr lang="en-US" sz="1800" dirty="0"/>
+              <a:t> = 3;</a:t>
             </a:r>
           </a:p>
           <a:p>
@@ -5776,11 +5784,11 @@
             </a:r>
             <a:r>
               <a:rPr lang="en-US" sz="1800" dirty="0"/>
-              <a:t>(2 == </a:t>
-            </a:r>
-            <a:r>
-              <a:rPr lang="en-US" sz="1800" dirty="0" err="1"/>
-              <a:t>background.BackgroundWidth</a:t>
+              <a:t>(3 == </a:t>
+            </a:r>
+            <a:r>
+              <a:rPr lang="en-US" sz="1800" dirty="0" err="1"/>
+              <a:t>background.BackgroundFileWidth</a:t>
             </a:r>
             <a:r>
               <a:rPr lang="en-US" sz="1800" dirty="0"/>
@@ -5792,6 +5800,12 @@
               <a:rPr lang="en-US" sz="1800" dirty="0"/>
               <a:t>        }</a:t>
             </a:r>
+          </a:p>
+          <a:p>
+            <a:pPr marL="0" indent="0">
+              <a:buNone/>
+            </a:pPr>
+            <a:endParaRPr lang="en-US" sz="1800" dirty="0"/>
           </a:p>
         </p:txBody>
       </p:sp>
@@ -5893,7 +5907,7 @@
             </a:r>
             <a:r>
               <a:rPr lang="en-US" sz="1800" dirty="0" err="1"/>
-              <a:t>BackgroundHeight_Test</a:t>
+              <a:t>BackgroundFileHeight_Test</a:t>
             </a:r>
             <a:r>
               <a:rPr lang="en-US" sz="1800" dirty="0"/>
@@ -5913,11 +5927,11 @@
             </a:r>
             <a:r>
               <a:rPr lang="en-US" sz="1800" dirty="0" err="1"/>
-              <a:t>background.BackgroundHeight</a:t>
-            </a:r>
-            <a:r>
-              <a:rPr lang="en-US" sz="1800" dirty="0"/>
-              <a:t> = 2;</a:t>
+              <a:t>background.BackgroundFileHeight</a:t>
+            </a:r>
+            <a:r>
+              <a:rPr lang="en-US" sz="1800" dirty="0"/>
+              <a:t> = 4;</a:t>
             </a:r>
           </a:p>
           <a:p>
@@ -5931,11 +5945,11 @@
             </a:r>
             <a:r>
               <a:rPr lang="en-US" sz="1800" dirty="0"/>
-              <a:t>(2 == </a:t>
-            </a:r>
-            <a:r>
-              <a:rPr lang="en-US" sz="1800" dirty="0" err="1"/>
-              <a:t>background.BackgroundHeight</a:t>
+              <a:t>(4 == </a:t>
+            </a:r>
+            <a:r>
+              <a:rPr lang="en-US" sz="1800" dirty="0" err="1"/>
+              <a:t>background.BackgroundFileHeight</a:t>
             </a:r>
             <a:r>
               <a:rPr lang="en-US" sz="1800" dirty="0"/>
@@ -5949,83 +5963,11 @@
             </a:r>
           </a:p>
           <a:p>
-            <a:endParaRPr lang="en-US" sz="1800" dirty="0"/>
-          </a:p>
-          <a:p>
-            <a:r>
-              <a:rPr lang="en-US" sz="1800" dirty="0"/>
-              <a:t>        [</a:t>
-            </a:r>
-            <a:r>
-              <a:rPr lang="en-US" sz="1800" dirty="0" err="1"/>
-              <a:t>TestMethod</a:t>
-            </a:r>
-            <a:r>
-              <a:rPr lang="en-US" sz="1800" dirty="0"/>
-              <a:t>]</a:t>
-            </a:r>
-          </a:p>
-          <a:p>
-            <a:r>
-              <a:rPr lang="en-US" sz="1800" dirty="0"/>
-              <a:t>        public void </a:t>
-            </a:r>
-            <a:r>
-              <a:rPr lang="en-US" sz="1800" dirty="0" err="1"/>
-              <a:t>BackgroundFileWidth_Test</a:t>
-            </a:r>
-            <a:r>
-              <a:rPr lang="en-US" sz="1800" dirty="0"/>
-              <a:t>()</a:t>
-            </a:r>
-          </a:p>
-          <a:p>
-            <a:r>
-              <a:rPr lang="en-US" sz="1800" dirty="0"/>
-              <a:t>        {</a:t>
-            </a:r>
-          </a:p>
-          <a:p>
-            <a:r>
-              <a:rPr lang="en-US" sz="1800" dirty="0"/>
-              <a:t>            </a:t>
-            </a:r>
-            <a:r>
-              <a:rPr lang="en-US" sz="1800" dirty="0" err="1"/>
-              <a:t>background.BackgroundFileWidth</a:t>
-            </a:r>
-            <a:r>
-              <a:rPr lang="en-US" sz="1800" dirty="0"/>
-              <a:t> = 3;</a:t>
-            </a:r>
-          </a:p>
-          <a:p>
-            <a:r>
-              <a:rPr lang="en-US" sz="1800" dirty="0"/>
-              <a:t>            </a:t>
-            </a:r>
-            <a:r>
-              <a:rPr lang="en-US" sz="1800" dirty="0" err="1"/>
-              <a:t>Assert.IsTrue</a:t>
-            </a:r>
-            <a:r>
-              <a:rPr lang="en-US" sz="1800" dirty="0"/>
-              <a:t>(3 == </a:t>
-            </a:r>
-            <a:r>
-              <a:rPr lang="en-US" sz="1800" dirty="0" err="1"/>
-              <a:t>background.BackgroundFileWidth</a:t>
-            </a:r>
-            <a:r>
-              <a:rPr lang="en-US" sz="1800" dirty="0"/>
-              <a:t>);</a:t>
-            </a:r>
-          </a:p>
-          <a:p>
-            <a:r>
-              <a:rPr lang="en-US" sz="1800" dirty="0"/>
-              <a:t>        }</a:t>
-            </a:r>
+            <a:r>
+              <a:rPr lang="en-US" sz="1800" dirty="0"/>
+              <a:t>    }</a:t>
+            </a:r>
+            <a:endParaRPr lang="en-US" sz="1800" dirty="0" smtClean="0"/>
           </a:p>
           <a:p>
             <a:pPr marL="0" indent="0">
@@ -6089,7 +6031,7 @@
           <a:p>
             <a:r>
               <a:rPr lang="en-US" dirty="0" smtClean="0"/>
-              <a:t>Background </a:t>
+              <a:t>Player </a:t>
             </a:r>
             <a:r>
               <a:rPr lang="en-US" dirty="0"/>
@@ -6114,86 +6056,130 @@
           <a:lstStyle/>
           <a:p>
             <a:r>
-              <a:rPr lang="en-US" sz="1800" dirty="0"/>
-              <a:t> [</a:t>
-            </a:r>
-            <a:r>
-              <a:rPr lang="en-US" sz="1800" dirty="0" err="1"/>
-              <a:t>TestMethod</a:t>
-            </a:r>
-            <a:r>
-              <a:rPr lang="en-US" sz="1800" dirty="0"/>
-              <a:t>]</a:t>
-            </a:r>
-          </a:p>
-          <a:p>
-            <a:r>
-              <a:rPr lang="en-US" sz="1800" dirty="0"/>
-              <a:t>        public void </a:t>
-            </a:r>
-            <a:r>
-              <a:rPr lang="en-US" sz="1800" dirty="0" err="1"/>
-              <a:t>BackgroundFileHeight_Test</a:t>
-            </a:r>
-            <a:r>
-              <a:rPr lang="en-US" sz="1800" dirty="0"/>
-              <a:t>()</a:t>
-            </a:r>
-          </a:p>
-          <a:p>
-            <a:r>
-              <a:rPr lang="en-US" sz="1800" dirty="0"/>
-              <a:t>        {</a:t>
-            </a:r>
-          </a:p>
-          <a:p>
-            <a:r>
-              <a:rPr lang="en-US" sz="1800" dirty="0"/>
-              <a:t>            </a:t>
-            </a:r>
-            <a:r>
-              <a:rPr lang="en-US" sz="1800" dirty="0" err="1"/>
-              <a:t>background.BackgroundFileHeight</a:t>
-            </a:r>
-            <a:r>
-              <a:rPr lang="en-US" sz="1800" dirty="0"/>
-              <a:t> = 4;</a:t>
-            </a:r>
-          </a:p>
-          <a:p>
-            <a:r>
-              <a:rPr lang="en-US" sz="1800" dirty="0"/>
-              <a:t>            </a:t>
-            </a:r>
-            <a:r>
-              <a:rPr lang="en-US" sz="1800" dirty="0" err="1"/>
-              <a:t>Assert.IsTrue</a:t>
-            </a:r>
-            <a:r>
-              <a:rPr lang="en-US" sz="1800" dirty="0"/>
-              <a:t>(4 == </a:t>
-            </a:r>
-            <a:r>
-              <a:rPr lang="en-US" sz="1800" dirty="0" err="1"/>
-              <a:t>background.BackgroundFileHeight</a:t>
-            </a:r>
-            <a:r>
-              <a:rPr lang="en-US" sz="1800" dirty="0"/>
-              <a:t>);</a:t>
-            </a:r>
-          </a:p>
-          <a:p>
-            <a:r>
-              <a:rPr lang="en-US" sz="1800" dirty="0"/>
-              <a:t>        }</a:t>
-            </a:r>
-          </a:p>
-          <a:p>
-            <a:r>
-              <a:rPr lang="en-US" sz="1800" dirty="0"/>
-              <a:t>    }</a:t>
-            </a:r>
-            <a:endParaRPr lang="en-US" sz="1800" dirty="0" smtClean="0"/>
+              <a:rPr lang="en-US" sz="2000" dirty="0"/>
+              <a:t>using System;</a:t>
+            </a:r>
+          </a:p>
+          <a:p>
+            <a:r>
+              <a:rPr lang="en-US" sz="2000" dirty="0"/>
+              <a:t>using </a:t>
+            </a:r>
+            <a:r>
+              <a:rPr lang="en-US" sz="2000" dirty="0" err="1"/>
+              <a:t>System.Text</a:t>
+            </a:r>
+            <a:r>
+              <a:rPr lang="en-US" sz="2000" dirty="0"/>
+              <a:t>;</a:t>
+            </a:r>
+          </a:p>
+          <a:p>
+            <a:r>
+              <a:rPr lang="en-US" sz="2000" dirty="0"/>
+              <a:t>using </a:t>
+            </a:r>
+            <a:r>
+              <a:rPr lang="en-US" sz="2000" dirty="0" err="1"/>
+              <a:t>System.Collections.Generic</a:t>
+            </a:r>
+            <a:r>
+              <a:rPr lang="en-US" sz="2000" dirty="0"/>
+              <a:t>;</a:t>
+            </a:r>
+          </a:p>
+          <a:p>
+            <a:r>
+              <a:rPr lang="en-US" sz="2000" dirty="0"/>
+              <a:t>using </a:t>
+            </a:r>
+            <a:r>
+              <a:rPr lang="en-US" sz="2000" dirty="0" err="1"/>
+              <a:t>System.Linq</a:t>
+            </a:r>
+            <a:r>
+              <a:rPr lang="en-US" sz="2000" dirty="0"/>
+              <a:t>;</a:t>
+            </a:r>
+          </a:p>
+          <a:p>
+            <a:r>
+              <a:rPr lang="en-US" sz="2000" dirty="0"/>
+              <a:t>using </a:t>
+            </a:r>
+            <a:r>
+              <a:rPr lang="en-US" sz="2000" dirty="0" err="1"/>
+              <a:t>Microsoft.VisualStudio.TestTools.UnitTesting</a:t>
+            </a:r>
+            <a:r>
+              <a:rPr lang="en-US" sz="2000" dirty="0"/>
+              <a:t>;</a:t>
+            </a:r>
+          </a:p>
+          <a:p>
+            <a:r>
+              <a:rPr lang="en-US" sz="2000" dirty="0"/>
+              <a:t>using </a:t>
+            </a:r>
+            <a:r>
+              <a:rPr lang="en-US" sz="2000" dirty="0" err="1"/>
+              <a:t>Project_Starfighter</a:t>
+            </a:r>
+            <a:r>
+              <a:rPr lang="en-US" sz="2000" dirty="0"/>
+              <a:t>;</a:t>
+            </a:r>
+          </a:p>
+          <a:p>
+            <a:r>
+              <a:rPr lang="en-US" sz="2000" dirty="0"/>
+              <a:t>using </a:t>
+            </a:r>
+            <a:r>
+              <a:rPr lang="en-US" sz="2000" dirty="0" err="1"/>
+              <a:t>Microsoft.Xna.Framework</a:t>
+            </a:r>
+            <a:r>
+              <a:rPr lang="en-US" sz="2000" dirty="0"/>
+              <a:t>;</a:t>
+            </a:r>
+          </a:p>
+          <a:p>
+            <a:r>
+              <a:rPr lang="en-US" sz="2000" dirty="0"/>
+              <a:t>using </a:t>
+            </a:r>
+            <a:r>
+              <a:rPr lang="en-US" sz="2000" dirty="0" err="1"/>
+              <a:t>Rhino.Mocks</a:t>
+            </a:r>
+            <a:r>
+              <a:rPr lang="en-US" sz="2000" dirty="0"/>
+              <a:t>;</a:t>
+            </a:r>
+          </a:p>
+          <a:p>
+            <a:endParaRPr lang="en-US" sz="2000" dirty="0"/>
+          </a:p>
+          <a:p>
+            <a:endParaRPr lang="en-US" sz="2000" dirty="0"/>
+          </a:p>
+          <a:p>
+            <a:r>
+              <a:rPr lang="en-US" sz="2000" dirty="0"/>
+              <a:t>namespace </a:t>
+            </a:r>
+            <a:r>
+              <a:rPr lang="en-US" sz="2000" dirty="0" err="1"/>
+              <a:t>Project_Starfighter_Test</a:t>
+            </a:r>
+            <a:endParaRPr lang="en-US" sz="2000" dirty="0"/>
+          </a:p>
+          <a:p>
+            <a:r>
+              <a:rPr lang="en-US" sz="2000" dirty="0"/>
+              <a:t>{</a:t>
+            </a:r>
           </a:p>
           <a:p>
             <a:pPr marL="0" indent="0">
@@ -6206,7 +6192,7 @@
     </p:spTree>
     <p:extLst>
       <p:ext uri="{BB962C8B-B14F-4D97-AF65-F5344CB8AC3E}">
-        <p14:creationId xmlns:p14="http://schemas.microsoft.com/office/powerpoint/2010/main" val="755878279"/>
+        <p14:creationId xmlns:p14="http://schemas.microsoft.com/office/powerpoint/2010/main" val="2636330540"/>
       </p:ext>
     </p:extLst>
   </p:cSld>
@@ -6282,129 +6268,216 @@
           <a:lstStyle/>
           <a:p>
             <a:r>
-              <a:rPr lang="en-US" sz="2000" dirty="0"/>
-              <a:t>using System;</a:t>
-            </a:r>
-          </a:p>
-          <a:p>
-            <a:r>
-              <a:rPr lang="en-US" sz="2000" dirty="0"/>
-              <a:t>using </a:t>
-            </a:r>
-            <a:r>
-              <a:rPr lang="en-US" sz="2000" dirty="0" err="1"/>
-              <a:t>System.Text</a:t>
-            </a:r>
-            <a:r>
-              <a:rPr lang="en-US" sz="2000" dirty="0"/>
+              <a:rPr lang="en-US" sz="1800" dirty="0"/>
+              <a:t>[</a:t>
+            </a:r>
+            <a:r>
+              <a:rPr lang="en-US" sz="1800" dirty="0" err="1"/>
+              <a:t>TestClass</a:t>
+            </a:r>
+            <a:r>
+              <a:rPr lang="en-US" sz="1800" dirty="0"/>
+              <a:t>]</a:t>
+            </a:r>
+          </a:p>
+          <a:p>
+            <a:r>
+              <a:rPr lang="en-US" sz="1800" dirty="0"/>
+              <a:t>    public class </a:t>
+            </a:r>
+            <a:r>
+              <a:rPr lang="en-US" sz="1800" dirty="0" err="1"/>
+              <a:t>Player_Test</a:t>
+            </a:r>
+            <a:r>
+              <a:rPr lang="en-US" sz="1800" dirty="0"/>
+              <a:t> : </a:t>
+            </a:r>
+            <a:r>
+              <a:rPr lang="en-US" sz="1800" dirty="0" err="1"/>
+              <a:t>Microsoft.Xna.Framework.Game</a:t>
+            </a:r>
+            <a:endParaRPr lang="en-US" sz="1800" dirty="0"/>
+          </a:p>
+          <a:p>
+            <a:r>
+              <a:rPr lang="en-US" sz="1800" dirty="0"/>
+              <a:t>    {</a:t>
+            </a:r>
+          </a:p>
+          <a:p>
+            <a:r>
+              <a:rPr lang="en-US" sz="1800" dirty="0"/>
+              <a:t>        Player </a:t>
+            </a:r>
+            <a:r>
+              <a:rPr lang="en-US" sz="1800" dirty="0" err="1"/>
+              <a:t>testplay</a:t>
+            </a:r>
+            <a:r>
+              <a:rPr lang="en-US" sz="1800" dirty="0"/>
               <a:t>;</a:t>
             </a:r>
           </a:p>
           <a:p>
             <a:r>
-              <a:rPr lang="en-US" sz="2000" dirty="0"/>
-              <a:t>using </a:t>
-            </a:r>
-            <a:r>
-              <a:rPr lang="en-US" sz="2000" dirty="0" err="1"/>
-              <a:t>System.Collections.Generic</a:t>
-            </a:r>
-            <a:r>
-              <a:rPr lang="en-US" sz="2000" dirty="0"/>
+              <a:rPr lang="en-US" sz="1800" dirty="0"/>
+              <a:t>        </a:t>
+            </a:r>
+            <a:r>
+              <a:rPr lang="en-US" sz="1800" dirty="0" err="1"/>
+              <a:t>GameTime</a:t>
+            </a:r>
+            <a:r>
+              <a:rPr lang="en-US" sz="1800" dirty="0"/>
+              <a:t> </a:t>
+            </a:r>
+            <a:r>
+              <a:rPr lang="en-US" sz="1800" dirty="0" err="1"/>
+              <a:t>gameTime</a:t>
+            </a:r>
+            <a:r>
+              <a:rPr lang="en-US" sz="1800" dirty="0"/>
               <a:t>;</a:t>
             </a:r>
           </a:p>
           <a:p>
             <a:r>
-              <a:rPr lang="en-US" sz="2000" dirty="0"/>
-              <a:t>using </a:t>
-            </a:r>
-            <a:r>
-              <a:rPr lang="en-US" sz="2000" dirty="0" err="1"/>
-              <a:t>System.Linq</a:t>
-            </a:r>
-            <a:r>
-              <a:rPr lang="en-US" sz="2000" dirty="0"/>
+              <a:rPr lang="en-US" sz="1800" dirty="0"/>
+              <a:t>        //</a:t>
+            </a:r>
+            <a:r>
+              <a:rPr lang="en-US" sz="1800" dirty="0" err="1"/>
+              <a:t>SpriteBatch</a:t>
+            </a:r>
+            <a:r>
+              <a:rPr lang="en-US" sz="1800" dirty="0"/>
+              <a:t> </a:t>
+            </a:r>
+            <a:r>
+              <a:rPr lang="en-US" sz="1800" dirty="0" err="1"/>
+              <a:t>sp</a:t>
+            </a:r>
+            <a:r>
+              <a:rPr lang="en-US" sz="1800" dirty="0"/>
               <a:t>;</a:t>
             </a:r>
           </a:p>
           <a:p>
-            <a:r>
-              <a:rPr lang="en-US" sz="2000" dirty="0"/>
-              <a:t>using </a:t>
-            </a:r>
-            <a:r>
-              <a:rPr lang="en-US" sz="2000" dirty="0" err="1"/>
-              <a:t>Microsoft.VisualStudio.TestTools.UnitTesting</a:t>
-            </a:r>
-            <a:r>
-              <a:rPr lang="en-US" sz="2000" dirty="0"/>
-              <a:t>;</a:t>
-            </a:r>
-          </a:p>
-          <a:p>
-            <a:r>
-              <a:rPr lang="en-US" sz="2000" dirty="0"/>
-              <a:t>using </a:t>
-            </a:r>
-            <a:r>
-              <a:rPr lang="en-US" sz="2000" dirty="0" err="1"/>
-              <a:t>Project_Starfighter</a:t>
-            </a:r>
-            <a:r>
-              <a:rPr lang="en-US" sz="2000" dirty="0"/>
-              <a:t>;</a:t>
-            </a:r>
-          </a:p>
-          <a:p>
-            <a:r>
-              <a:rPr lang="en-US" sz="2000" dirty="0"/>
-              <a:t>using </a:t>
-            </a:r>
-            <a:r>
-              <a:rPr lang="en-US" sz="2000" dirty="0" err="1"/>
-              <a:t>Microsoft.Xna.Framework</a:t>
-            </a:r>
-            <a:r>
-              <a:rPr lang="en-US" sz="2000" dirty="0"/>
-              <a:t>;</a:t>
-            </a:r>
-          </a:p>
-          <a:p>
-            <a:r>
-              <a:rPr lang="en-US" sz="2000" dirty="0"/>
-              <a:t>using </a:t>
-            </a:r>
-            <a:r>
-              <a:rPr lang="en-US" sz="2000" dirty="0" err="1"/>
-              <a:t>Rhino.Mocks</a:t>
-            </a:r>
-            <a:r>
-              <a:rPr lang="en-US" sz="2000" dirty="0"/>
-              <a:t>;</a:t>
-            </a:r>
-          </a:p>
-          <a:p>
-            <a:endParaRPr lang="en-US" sz="2000" dirty="0"/>
-          </a:p>
-          <a:p>
-            <a:endParaRPr lang="en-US" sz="2000" dirty="0"/>
-          </a:p>
-          <a:p>
-            <a:r>
-              <a:rPr lang="en-US" sz="2000" dirty="0"/>
-              <a:t>namespace </a:t>
-            </a:r>
-            <a:r>
-              <a:rPr lang="en-US" sz="2000" dirty="0" err="1"/>
-              <a:t>Project_Starfighter_Test</a:t>
-            </a:r>
-            <a:endParaRPr lang="en-US" sz="2000" dirty="0"/>
-          </a:p>
-          <a:p>
-            <a:r>
-              <a:rPr lang="en-US" sz="2000" dirty="0"/>
-              <a:t>{</a:t>
+            <a:endParaRPr lang="en-US" sz="1800" dirty="0"/>
+          </a:p>
+          <a:p>
+            <a:r>
+              <a:rPr lang="en-US" sz="1800" dirty="0"/>
+              <a:t>        public </a:t>
+            </a:r>
+            <a:r>
+              <a:rPr lang="en-US" sz="1800" dirty="0" err="1"/>
+              <a:t>Player_Test</a:t>
+            </a:r>
+            <a:r>
+              <a:rPr lang="en-US" sz="1800" dirty="0"/>
+              <a:t>()</a:t>
+            </a:r>
+          </a:p>
+          <a:p>
+            <a:r>
+              <a:rPr lang="en-US" sz="1800" dirty="0"/>
+              <a:t>        {</a:t>
+            </a:r>
+          </a:p>
+          <a:p>
+            <a:r>
+              <a:rPr lang="en-US" sz="1800" dirty="0"/>
+              <a:t>            Background </a:t>
+            </a:r>
+            <a:r>
+              <a:rPr lang="en-US" sz="1800" dirty="0" err="1"/>
+              <a:t>background</a:t>
+            </a:r>
+            <a:r>
+              <a:rPr lang="en-US" sz="1800" dirty="0"/>
+              <a:t> = new Background();</a:t>
+            </a:r>
+          </a:p>
+          <a:p>
+            <a:r>
+              <a:rPr lang="en-US" sz="1800" dirty="0"/>
+              <a:t>            </a:t>
+            </a:r>
+            <a:r>
+              <a:rPr lang="en-US" sz="1800" dirty="0" err="1"/>
+              <a:t>gameTime</a:t>
+            </a:r>
+            <a:r>
+              <a:rPr lang="en-US" sz="1800" dirty="0"/>
+              <a:t> = </a:t>
+            </a:r>
+            <a:r>
+              <a:rPr lang="en-US" sz="1800" dirty="0" err="1"/>
+              <a:t>MockRepository.GenerateStub</a:t>
+            </a:r>
+            <a:r>
+              <a:rPr lang="en-US" sz="1800" dirty="0"/>
+              <a:t>&lt;</a:t>
+            </a:r>
+            <a:r>
+              <a:rPr lang="en-US" sz="1800" dirty="0" err="1"/>
+              <a:t>GameTime</a:t>
+            </a:r>
+            <a:r>
+              <a:rPr lang="en-US" sz="1800" dirty="0"/>
+              <a:t>&gt;();</a:t>
+            </a:r>
+          </a:p>
+          <a:p>
+            <a:r>
+              <a:rPr lang="en-US" sz="1800" dirty="0"/>
+              <a:t>            </a:t>
+            </a:r>
+            <a:r>
+              <a:rPr lang="en-US" sz="1800" dirty="0" err="1"/>
+              <a:t>testplay</a:t>
+            </a:r>
+            <a:r>
+              <a:rPr lang="en-US" sz="1800" dirty="0"/>
+              <a:t> = new Player();</a:t>
+            </a:r>
+          </a:p>
+          <a:p>
+            <a:r>
+              <a:rPr lang="en-US" sz="1800" dirty="0"/>
+              <a:t>            //</a:t>
+            </a:r>
+            <a:r>
+              <a:rPr lang="en-US" sz="1800" dirty="0" err="1"/>
+              <a:t>sb</a:t>
+            </a:r>
+            <a:r>
+              <a:rPr lang="en-US" sz="1800" dirty="0"/>
+              <a:t> = </a:t>
+            </a:r>
+            <a:r>
+              <a:rPr lang="en-US" sz="1800" dirty="0" err="1"/>
+              <a:t>MockRepository.GenerateStub</a:t>
+            </a:r>
+            <a:r>
+              <a:rPr lang="en-US" sz="1800" dirty="0"/>
+              <a:t>&lt;</a:t>
+            </a:r>
+            <a:r>
+              <a:rPr lang="en-US" sz="1800" dirty="0" err="1"/>
+              <a:t>SpriteBatch</a:t>
+            </a:r>
+            <a:r>
+              <a:rPr lang="en-US" sz="1800" dirty="0"/>
+              <a:t>&gt;();</a:t>
+            </a:r>
+          </a:p>
+          <a:p>
+            <a:r>
+              <a:rPr lang="en-US" sz="1800" dirty="0"/>
+              <a:t>        }</a:t>
             </a:r>
           </a:p>
           <a:p>
@@ -6418,7 +6491,7 @@
     </p:spTree>
     <p:extLst>
       <p:ext uri="{BB962C8B-B14F-4D97-AF65-F5344CB8AC3E}">
-        <p14:creationId xmlns:p14="http://schemas.microsoft.com/office/powerpoint/2010/main" val="2636330540"/>
+        <p14:creationId xmlns:p14="http://schemas.microsoft.com/office/powerpoint/2010/main" val="3670958368"/>
       </p:ext>
     </p:extLst>
   </p:cSld>
@@ -6499,7 +6572,7 @@
             </a:r>
             <a:r>
               <a:rPr lang="en-US" sz="1800" dirty="0" err="1"/>
-              <a:t>TestClass</a:t>
+              <a:t>TestMethod</a:t>
             </a:r>
             <a:r>
               <a:rPr lang="en-US" sz="1800" dirty="0"/>
@@ -6509,97 +6582,90 @@
           <a:p>
             <a:r>
               <a:rPr lang="en-US" sz="1800" dirty="0"/>
-              <a:t>    public class </a:t>
-            </a:r>
-            <a:r>
-              <a:rPr lang="en-US" sz="1800" dirty="0" err="1"/>
-              <a:t>Player_Test</a:t>
-            </a:r>
-            <a:r>
-              <a:rPr lang="en-US" sz="1800" dirty="0"/>
-              <a:t> : </a:t>
-            </a:r>
-            <a:r>
-              <a:rPr lang="en-US" sz="1800" dirty="0" err="1"/>
-              <a:t>Microsoft.Xna.Framework.Game</a:t>
-            </a:r>
+              <a:t>        public void </a:t>
+            </a:r>
+            <a:r>
+              <a:rPr lang="en-US" sz="1800" dirty="0" err="1"/>
+              <a:t>XPosition_Test</a:t>
+            </a:r>
+            <a:r>
+              <a:rPr lang="en-US" sz="1800" dirty="0"/>
+              <a:t>()</a:t>
+            </a:r>
+          </a:p>
+          <a:p>
+            <a:r>
+              <a:rPr lang="en-US" sz="1800" dirty="0"/>
+              <a:t>        {</a:t>
+            </a:r>
+          </a:p>
+          <a:p>
+            <a:r>
+              <a:rPr lang="en-US" sz="1800" dirty="0"/>
+              <a:t>            </a:t>
+            </a:r>
+            <a:r>
+              <a:rPr lang="en-US" sz="1800" dirty="0" err="1"/>
+              <a:t>testplay.X</a:t>
+            </a:r>
+            <a:r>
+              <a:rPr lang="en-US" sz="1800" dirty="0"/>
+              <a:t> = 11;</a:t>
+            </a:r>
+          </a:p>
+          <a:p>
+            <a:r>
+              <a:rPr lang="en-US" sz="1800" dirty="0"/>
+              <a:t>            </a:t>
+            </a:r>
+            <a:r>
+              <a:rPr lang="en-US" sz="1800" dirty="0" err="1"/>
+              <a:t>Assert.IsTrue</a:t>
+            </a:r>
+            <a:r>
+              <a:rPr lang="en-US" sz="1800" dirty="0"/>
+              <a:t>(11 == </a:t>
+            </a:r>
+            <a:r>
+              <a:rPr lang="en-US" sz="1800" dirty="0" err="1"/>
+              <a:t>testplay.X</a:t>
+            </a:r>
+            <a:r>
+              <a:rPr lang="en-US" sz="1800" dirty="0"/>
+              <a:t>);</a:t>
+            </a:r>
+          </a:p>
+          <a:p>
+            <a:r>
+              <a:rPr lang="en-US" sz="1800" dirty="0"/>
+              <a:t>        }</a:t>
+            </a:r>
+          </a:p>
+          <a:p>
             <a:endParaRPr lang="en-US" sz="1800" dirty="0"/>
           </a:p>
           <a:p>
             <a:r>
               <a:rPr lang="en-US" sz="1800" dirty="0"/>
-              <a:t>    {</a:t>
-            </a:r>
-          </a:p>
-          <a:p>
-            <a:r>
-              <a:rPr lang="en-US" sz="1800" dirty="0"/>
-              <a:t>        Player </a:t>
-            </a:r>
-            <a:r>
-              <a:rPr lang="en-US" sz="1800" dirty="0" err="1"/>
-              <a:t>testplay</a:t>
-            </a:r>
-            <a:r>
-              <a:rPr lang="en-US" sz="1800" dirty="0"/>
-              <a:t>;</a:t>
-            </a:r>
-          </a:p>
-          <a:p>
-            <a:r>
-              <a:rPr lang="en-US" sz="1800" dirty="0"/>
-              <a:t>        </a:t>
-            </a:r>
-            <a:r>
-              <a:rPr lang="en-US" sz="1800" dirty="0" err="1"/>
-              <a:t>GameTime</a:t>
-            </a:r>
-            <a:r>
-              <a:rPr lang="en-US" sz="1800" dirty="0"/>
-              <a:t> </a:t>
-            </a:r>
-            <a:r>
-              <a:rPr lang="en-US" sz="1800" dirty="0" err="1"/>
-              <a:t>gameTime</a:t>
-            </a:r>
-            <a:r>
-              <a:rPr lang="en-US" sz="1800" dirty="0"/>
-              <a:t>;</a:t>
-            </a:r>
-          </a:p>
-          <a:p>
-            <a:r>
-              <a:rPr lang="en-US" sz="1800" dirty="0"/>
-              <a:t>        //</a:t>
-            </a:r>
-            <a:r>
-              <a:rPr lang="en-US" sz="1800" dirty="0" err="1"/>
-              <a:t>SpriteBatch</a:t>
-            </a:r>
-            <a:r>
-              <a:rPr lang="en-US" sz="1800" dirty="0"/>
-              <a:t> </a:t>
-            </a:r>
-            <a:r>
-              <a:rPr lang="en-US" sz="1800" dirty="0" err="1"/>
-              <a:t>sp</a:t>
-            </a:r>
-            <a:r>
-              <a:rPr lang="en-US" sz="1800" dirty="0"/>
-              <a:t>;</a:t>
-            </a:r>
-          </a:p>
-          <a:p>
-            <a:endParaRPr lang="en-US" sz="1800" dirty="0"/>
-          </a:p>
-          <a:p>
-            <a:r>
-              <a:rPr lang="en-US" sz="1800" dirty="0"/>
-              <a:t>        public </a:t>
-            </a:r>
-            <a:r>
-              <a:rPr lang="en-US" sz="1800" dirty="0" err="1"/>
-              <a:t>Player_Test</a:t>
+              <a:t>        [</a:t>
+            </a:r>
+            <a:r>
+              <a:rPr lang="en-US" sz="1800" dirty="0" err="1"/>
+              <a:t>TestMethod</a:t>
+            </a:r>
+            <a:r>
+              <a:rPr lang="en-US" sz="1800" dirty="0"/>
+              <a:t>]</a:t>
+            </a:r>
+          </a:p>
+          <a:p>
+            <a:r>
+              <a:rPr lang="en-US" sz="1800" dirty="0"/>
+              <a:t>        public void </a:t>
+            </a:r>
+            <a:r>
+              <a:rPr lang="en-US" sz="1800" dirty="0" err="1"/>
+              <a:t>YPosition_Test</a:t>
             </a:r>
             <a:r>
               <a:rPr lang="en-US" sz="1800" dirty="0"/>
@@ -6615,45 +6681,15 @@
           <a:p>
             <a:r>
               <a:rPr lang="en-US" sz="1800" dirty="0"/>
-              <a:t>            Background </a:t>
-            </a:r>
-            <a:r>
-              <a:rPr lang="en-US" sz="1800" dirty="0" err="1"/>
-              <a:t>background</a:t>
-            </a:r>
-            <a:r>
-              <a:rPr lang="en-US" sz="1800" dirty="0"/>
-              <a:t> = new Background();</a:t>
-            </a:r>
-          </a:p>
-          <a:p>
-            <a:r>
-              <a:rPr lang="en-US" sz="1800" dirty="0"/>
               <a:t>            </a:t>
             </a:r>
             <a:r>
               <a:rPr lang="en-US" sz="1800" dirty="0" err="1"/>
-              <a:t>gameTime</a:t>
-            </a:r>
-            <a:r>
-              <a:rPr lang="en-US" sz="1800" dirty="0"/>
-              <a:t> = </a:t>
-            </a:r>
-            <a:r>
-              <a:rPr lang="en-US" sz="1800" dirty="0" err="1"/>
-              <a:t>MockRepository.GenerateStub</a:t>
-            </a:r>
-            <a:r>
-              <a:rPr lang="en-US" sz="1800" dirty="0"/>
-              <a:t>&lt;</a:t>
-            </a:r>
-            <a:r>
-              <a:rPr lang="en-US" sz="1800" dirty="0" err="1"/>
-              <a:t>GameTime</a:t>
-            </a:r>
-            <a:r>
-              <a:rPr lang="en-US" sz="1800" dirty="0"/>
-              <a:t>&gt;();</a:t>
+              <a:t>testplay.Y</a:t>
+            </a:r>
+            <a:r>
+              <a:rPr lang="en-US" sz="1800" dirty="0"/>
+              <a:t> = 12;</a:t>
             </a:r>
           </a:p>
           <a:p>
@@ -6663,41 +6699,19 @@
             </a:r>
             <a:r>
               <a:rPr lang="en-US" sz="1800" dirty="0" err="1"/>
-              <a:t>testplay</a:t>
-            </a:r>
-            <a:r>
-              <a:rPr lang="en-US" sz="1800" dirty="0"/>
-              <a:t> = new Player();</a:t>
-            </a:r>
-          </a:p>
-          <a:p>
-            <a:r>
-              <a:rPr lang="en-US" sz="1800" dirty="0"/>
-              <a:t>            //</a:t>
-            </a:r>
-            <a:r>
-              <a:rPr lang="en-US" sz="1800" dirty="0" err="1"/>
-              <a:t>sb</a:t>
-            </a:r>
-            <a:r>
-              <a:rPr lang="en-US" sz="1800" dirty="0"/>
-              <a:t> = </a:t>
-            </a:r>
-            <a:r>
-              <a:rPr lang="en-US" sz="1800" dirty="0" err="1"/>
-              <a:t>MockRepository.GenerateStub</a:t>
-            </a:r>
-            <a:r>
-              <a:rPr lang="en-US" sz="1800" dirty="0"/>
-              <a:t>&lt;</a:t>
-            </a:r>
-            <a:r>
-              <a:rPr lang="en-US" sz="1800" dirty="0" err="1"/>
-              <a:t>SpriteBatch</a:t>
-            </a:r>
-            <a:r>
-              <a:rPr lang="en-US" sz="1800" dirty="0"/>
-              <a:t>&gt;();</a:t>
+              <a:t>Assert.IsTrue</a:t>
+            </a:r>
+            <a:r>
+              <a:rPr lang="en-US" sz="1800" dirty="0"/>
+              <a:t>(12 == </a:t>
+            </a:r>
+            <a:r>
+              <a:rPr lang="en-US" sz="1800" dirty="0" err="1"/>
+              <a:t>testplay.Y</a:t>
+            </a:r>
+            <a:r>
+              <a:rPr lang="en-US" sz="1800" dirty="0"/>
+              <a:t>);</a:t>
             </a:r>
           </a:p>
           <a:p>
@@ -6717,7 +6731,7 @@
     </p:spTree>
     <p:extLst>
       <p:ext uri="{BB962C8B-B14F-4D97-AF65-F5344CB8AC3E}">
-        <p14:creationId xmlns:p14="http://schemas.microsoft.com/office/powerpoint/2010/main" val="3670958368"/>
+        <p14:creationId xmlns:p14="http://schemas.microsoft.com/office/powerpoint/2010/main" val="1077691534"/>
       </p:ext>
     </p:extLst>
   </p:cSld>
@@ -6794,7 +6808,7 @@
           <a:p>
             <a:r>
               <a:rPr lang="en-US" sz="1800" dirty="0"/>
-              <a:t>[</a:t>
+              <a:t> [</a:t>
             </a:r>
             <a:r>
               <a:rPr lang="en-US" sz="1800" dirty="0" err="1"/>
@@ -6812,7 +6826,7 @@
             </a:r>
             <a:r>
               <a:rPr lang="en-US" sz="1800" dirty="0" err="1"/>
-              <a:t>XPosition_Test</a:t>
+              <a:t>Facing_Test</a:t>
             </a:r>
             <a:r>
               <a:rPr lang="en-US" sz="1800" dirty="0"/>
@@ -6832,11 +6846,11 @@
             </a:r>
             <a:r>
               <a:rPr lang="en-US" sz="1800" dirty="0" err="1"/>
-              <a:t>testplay.X</a:t>
-            </a:r>
-            <a:r>
-              <a:rPr lang="en-US" sz="1800" dirty="0"/>
-              <a:t> = 11;</a:t>
+              <a:t>testplay.Facing</a:t>
+            </a:r>
+            <a:r>
+              <a:rPr lang="en-US" sz="1800" dirty="0"/>
+              <a:t> = 1;</a:t>
             </a:r>
           </a:p>
           <a:p>
@@ -6850,11 +6864,11 @@
             </a:r>
             <a:r>
               <a:rPr lang="en-US" sz="1800" dirty="0"/>
-              <a:t>(11 == </a:t>
-            </a:r>
-            <a:r>
-              <a:rPr lang="en-US" sz="1800" dirty="0" err="1"/>
-              <a:t>testplay.X</a:t>
+              <a:t>(1 == </a:t>
+            </a:r>
+            <a:r>
+              <a:rPr lang="en-US" sz="1800" dirty="0" err="1"/>
+              <a:t>testplay.Facing</a:t>
             </a:r>
             <a:r>
               <a:rPr lang="en-US" sz="1800" dirty="0"/>
@@ -6891,7 +6905,7 @@
             </a:r>
             <a:r>
               <a:rPr lang="en-US" sz="1800" dirty="0" err="1"/>
-              <a:t>YPosition_Test</a:t>
+              <a:t>Thrusting_Test</a:t>
             </a:r>
             <a:r>
               <a:rPr lang="en-US" sz="1800" dirty="0"/>
@@ -6911,11 +6925,11 @@
             </a:r>
             <a:r>
               <a:rPr lang="en-US" sz="1800" dirty="0" err="1"/>
-              <a:t>testplay.Y</a:t>
-            </a:r>
-            <a:r>
-              <a:rPr lang="en-US" sz="1800" dirty="0"/>
-              <a:t> = 12;</a:t>
+              <a:t>testplay.Thrusting</a:t>
+            </a:r>
+            <a:r>
+              <a:rPr lang="en-US" sz="1800" dirty="0"/>
+              <a:t> = true;</a:t>
             </a:r>
           </a:p>
           <a:p>
@@ -6929,11 +6943,11 @@
             </a:r>
             <a:r>
               <a:rPr lang="en-US" sz="1800" dirty="0"/>
-              <a:t>(12 == </a:t>
-            </a:r>
-            <a:r>
-              <a:rPr lang="en-US" sz="1800" dirty="0" err="1"/>
-              <a:t>testplay.Y</a:t>
+              <a:t>(true == </a:t>
+            </a:r>
+            <a:r>
+              <a:rPr lang="en-US" sz="1800" dirty="0" err="1"/>
+              <a:t>testplay.Thrusting</a:t>
             </a:r>
             <a:r>
               <a:rPr lang="en-US" sz="1800" dirty="0"/>
@@ -7052,246 +7066,6 @@
             </a:r>
             <a:r>
               <a:rPr lang="en-US" sz="1800" dirty="0" err="1"/>
-              <a:t>Facing_Test</a:t>
-            </a:r>
-            <a:r>
-              <a:rPr lang="en-US" sz="1800" dirty="0"/>
-              <a:t>()</a:t>
-            </a:r>
-          </a:p>
-          <a:p>
-            <a:r>
-              <a:rPr lang="en-US" sz="1800" dirty="0"/>
-              <a:t>        {</a:t>
-            </a:r>
-          </a:p>
-          <a:p>
-            <a:r>
-              <a:rPr lang="en-US" sz="1800" dirty="0"/>
-              <a:t>            </a:t>
-            </a:r>
-            <a:r>
-              <a:rPr lang="en-US" sz="1800" dirty="0" err="1"/>
-              <a:t>testplay.Facing</a:t>
-            </a:r>
-            <a:r>
-              <a:rPr lang="en-US" sz="1800" dirty="0"/>
-              <a:t> = 1;</a:t>
-            </a:r>
-          </a:p>
-          <a:p>
-            <a:r>
-              <a:rPr lang="en-US" sz="1800" dirty="0"/>
-              <a:t>            </a:t>
-            </a:r>
-            <a:r>
-              <a:rPr lang="en-US" sz="1800" dirty="0" err="1"/>
-              <a:t>Assert.IsTrue</a:t>
-            </a:r>
-            <a:r>
-              <a:rPr lang="en-US" sz="1800" dirty="0"/>
-              <a:t>(1 == </a:t>
-            </a:r>
-            <a:r>
-              <a:rPr lang="en-US" sz="1800" dirty="0" err="1"/>
-              <a:t>testplay.Facing</a:t>
-            </a:r>
-            <a:r>
-              <a:rPr lang="en-US" sz="1800" dirty="0"/>
-              <a:t>);</a:t>
-            </a:r>
-          </a:p>
-          <a:p>
-            <a:r>
-              <a:rPr lang="en-US" sz="1800" dirty="0"/>
-              <a:t>        }</a:t>
-            </a:r>
-          </a:p>
-          <a:p>
-            <a:endParaRPr lang="en-US" sz="1800" dirty="0"/>
-          </a:p>
-          <a:p>
-            <a:r>
-              <a:rPr lang="en-US" sz="1800" dirty="0"/>
-              <a:t>        [</a:t>
-            </a:r>
-            <a:r>
-              <a:rPr lang="en-US" sz="1800" dirty="0" err="1"/>
-              <a:t>TestMethod</a:t>
-            </a:r>
-            <a:r>
-              <a:rPr lang="en-US" sz="1800" dirty="0"/>
-              <a:t>]</a:t>
-            </a:r>
-          </a:p>
-          <a:p>
-            <a:r>
-              <a:rPr lang="en-US" sz="1800" dirty="0"/>
-              <a:t>        public void </a:t>
-            </a:r>
-            <a:r>
-              <a:rPr lang="en-US" sz="1800" dirty="0" err="1"/>
-              <a:t>Thrusting_Test</a:t>
-            </a:r>
-            <a:r>
-              <a:rPr lang="en-US" sz="1800" dirty="0"/>
-              <a:t>()</a:t>
-            </a:r>
-          </a:p>
-          <a:p>
-            <a:r>
-              <a:rPr lang="en-US" sz="1800" dirty="0"/>
-              <a:t>        {</a:t>
-            </a:r>
-          </a:p>
-          <a:p>
-            <a:r>
-              <a:rPr lang="en-US" sz="1800" dirty="0"/>
-              <a:t>            </a:t>
-            </a:r>
-            <a:r>
-              <a:rPr lang="en-US" sz="1800" dirty="0" err="1"/>
-              <a:t>testplay.Thrusting</a:t>
-            </a:r>
-            <a:r>
-              <a:rPr lang="en-US" sz="1800" dirty="0"/>
-              <a:t> = true;</a:t>
-            </a:r>
-          </a:p>
-          <a:p>
-            <a:r>
-              <a:rPr lang="en-US" sz="1800" dirty="0"/>
-              <a:t>            </a:t>
-            </a:r>
-            <a:r>
-              <a:rPr lang="en-US" sz="1800" dirty="0" err="1"/>
-              <a:t>Assert.IsTrue</a:t>
-            </a:r>
-            <a:r>
-              <a:rPr lang="en-US" sz="1800" dirty="0"/>
-              <a:t>(true == </a:t>
-            </a:r>
-            <a:r>
-              <a:rPr lang="en-US" sz="1800" dirty="0" err="1"/>
-              <a:t>testplay.Thrusting</a:t>
-            </a:r>
-            <a:r>
-              <a:rPr lang="en-US" sz="1800" dirty="0"/>
-              <a:t>);</a:t>
-            </a:r>
-          </a:p>
-          <a:p>
-            <a:r>
-              <a:rPr lang="en-US" sz="1800" dirty="0"/>
-              <a:t>        }</a:t>
-            </a:r>
-          </a:p>
-          <a:p>
-            <a:pPr marL="0" indent="0">
-              <a:buNone/>
-            </a:pPr>
-            <a:endParaRPr lang="en-US" sz="1800" dirty="0"/>
-          </a:p>
-        </p:txBody>
-      </p:sp>
-    </p:spTree>
-    <p:extLst>
-      <p:ext uri="{BB962C8B-B14F-4D97-AF65-F5344CB8AC3E}">
-        <p14:creationId xmlns:p14="http://schemas.microsoft.com/office/powerpoint/2010/main" val="1077691534"/>
-      </p:ext>
-    </p:extLst>
-  </p:cSld>
-  <p:clrMapOvr>
-    <a:masterClrMapping/>
-  </p:clrMapOvr>
-  <p:timing>
-    <p:tnLst>
-      <p:par>
-        <p:cTn id="1" dur="indefinite" restart="never" nodeType="tmRoot"/>
-      </p:par>
-    </p:tnLst>
-  </p:timing>
-</p:sld>
-</file>
-
-<file path=ppt/slides/slide29.xml><?xml version="1.0" encoding="utf-8"?>
-<p:sld xmlns:a="http://schemas.openxmlformats.org/drawingml/2006/main" xmlns:r="http://schemas.openxmlformats.org/officeDocument/2006/relationships" xmlns:p="http://schemas.openxmlformats.org/presentationml/2006/main">
-  <p:cSld>
-    <p:spTree>
-      <p:nvGrpSpPr>
-        <p:cNvPr id="1" name=""/>
-        <p:cNvGrpSpPr/>
-        <p:nvPr/>
-      </p:nvGrpSpPr>
-      <p:grpSpPr>
-        <a:xfrm>
-          <a:off x="0" y="0"/>
-          <a:ext cx="0" cy="0"/>
-          <a:chOff x="0" y="0"/>
-          <a:chExt cx="0" cy="0"/>
-        </a:xfrm>
-      </p:grpSpPr>
-      <p:sp>
-        <p:nvSpPr>
-          <p:cNvPr id="2" name="Title 1"/>
-          <p:cNvSpPr>
-            <a:spLocks noGrp="1"/>
-          </p:cNvSpPr>
-          <p:nvPr>
-            <p:ph type="title"/>
-          </p:nvPr>
-        </p:nvSpPr>
-        <p:spPr/>
-        <p:txBody>
-          <a:bodyPr/>
-          <a:lstStyle/>
-          <a:p>
-            <a:r>
-              <a:rPr lang="en-US" dirty="0" smtClean="0"/>
-              <a:t>Player </a:t>
-            </a:r>
-            <a:r>
-              <a:rPr lang="en-US" dirty="0"/>
-              <a:t>Test Code</a:t>
-            </a:r>
-          </a:p>
-        </p:txBody>
-      </p:sp>
-      <p:sp>
-        <p:nvSpPr>
-          <p:cNvPr id="3" name="Content Placeholder 2"/>
-          <p:cNvSpPr>
-            <a:spLocks noGrp="1"/>
-          </p:cNvSpPr>
-          <p:nvPr>
-            <p:ph idx="1"/>
-          </p:nvPr>
-        </p:nvSpPr>
-        <p:spPr/>
-        <p:txBody>
-          <a:bodyPr/>
-          <a:lstStyle/>
-          <a:p>
-            <a:r>
-              <a:rPr lang="en-US" sz="1800" dirty="0"/>
-              <a:t> [</a:t>
-            </a:r>
-            <a:r>
-              <a:rPr lang="en-US" sz="1800" dirty="0" err="1"/>
-              <a:t>TestMethod</a:t>
-            </a:r>
-            <a:r>
-              <a:rPr lang="en-US" sz="1800" dirty="0"/>
-              <a:t>]</a:t>
-            </a:r>
-          </a:p>
-          <a:p>
-            <a:r>
-              <a:rPr lang="en-US" sz="1800" dirty="0"/>
-              <a:t>        public void </a:t>
-            </a:r>
-            <a:r>
-              <a:rPr lang="en-US" sz="1800" dirty="0" err="1"/>
               <a:t>ScrollRate_Test</a:t>
             </a:r>
             <a:r>
@@ -7454,410 +7228,7 @@
 </p:sld>
 </file>
 
-<file path=ppt/slides/slide3.xml><?xml version="1.0" encoding="utf-8"?>
-<p:sld xmlns:a="http://schemas.openxmlformats.org/drawingml/2006/main" xmlns:r="http://schemas.openxmlformats.org/officeDocument/2006/relationships" xmlns:p="http://schemas.openxmlformats.org/presentationml/2006/main">
-  <p:cSld>
-    <p:spTree>
-      <p:nvGrpSpPr>
-        <p:cNvPr id="1" name=""/>
-        <p:cNvGrpSpPr/>
-        <p:nvPr/>
-      </p:nvGrpSpPr>
-      <p:grpSpPr>
-        <a:xfrm>
-          <a:off x="0" y="0"/>
-          <a:ext cx="0" cy="0"/>
-          <a:chOff x="0" y="0"/>
-          <a:chExt cx="0" cy="0"/>
-        </a:xfrm>
-      </p:grpSpPr>
-      <p:sp>
-        <p:nvSpPr>
-          <p:cNvPr id="2" name="Title 1"/>
-          <p:cNvSpPr>
-            <a:spLocks noGrp="1"/>
-          </p:cNvSpPr>
-          <p:nvPr>
-            <p:ph type="title"/>
-          </p:nvPr>
-        </p:nvSpPr>
-        <p:spPr/>
-        <p:txBody>
-          <a:bodyPr/>
-          <a:lstStyle/>
-          <a:p>
-            <a:r>
-              <a:rPr lang="en-US" dirty="0" smtClean="0"/>
-              <a:t>User Stories for 1.0 Part 2</a:t>
-            </a:r>
-            <a:endParaRPr lang="en-US" dirty="0"/>
-          </a:p>
-        </p:txBody>
-      </p:sp>
-      <p:sp>
-        <p:nvSpPr>
-          <p:cNvPr id="3" name="Content Placeholder 2"/>
-          <p:cNvSpPr>
-            <a:spLocks noGrp="1"/>
-          </p:cNvSpPr>
-          <p:nvPr>
-            <p:ph idx="1"/>
-          </p:nvPr>
-        </p:nvSpPr>
-        <p:spPr/>
-        <p:txBody>
-          <a:bodyPr/>
-          <a:lstStyle/>
-          <a:p>
-            <a:r>
-              <a:rPr lang="en-US" sz="2800" b="1" dirty="0" smtClean="0"/>
-              <a:t>As a user who clicks on the menu option, 'scores,' I want to be presented with a list of the highest scores.</a:t>
-            </a:r>
-          </a:p>
-          <a:p>
-            <a:r>
-              <a:rPr lang="en-US" sz="2800" b="1" dirty="0" smtClean="0"/>
-              <a:t>As a user who clicks on the menu option, 'Quit,' I want to close the game.</a:t>
-            </a:r>
-          </a:p>
-          <a:p>
-            <a:r>
-              <a:rPr lang="en-US" sz="2800" b="1" dirty="0" smtClean="0"/>
-              <a:t>As a user who clicks on the menu option, 'instructions,' I want to be presented with the instructions to play the game.</a:t>
-            </a:r>
-          </a:p>
-          <a:p>
-            <a:r>
-              <a:rPr lang="en-US" sz="2800" b="1" dirty="0" smtClean="0"/>
-              <a:t>As a user who clicks on the </a:t>
-            </a:r>
-            <a:r>
-              <a:rPr lang="en-US" sz="2800" b="1" dirty="0" err="1" smtClean="0"/>
-              <a:t>mnu</a:t>
-            </a:r>
-            <a:r>
-              <a:rPr lang="en-US" sz="2800" b="1" dirty="0" smtClean="0"/>
-              <a:t> option, ‘credits,’ I want to be presented with the credits for the game</a:t>
-            </a:r>
-          </a:p>
-          <a:p>
-            <a:endParaRPr lang="en-US" sz="2800" dirty="0" smtClean="0"/>
-          </a:p>
-          <a:p>
-            <a:endParaRPr lang="en-US" sz="2800" dirty="0"/>
-          </a:p>
-        </p:txBody>
-      </p:sp>
-    </p:spTree>
-  </p:cSld>
-  <p:clrMapOvr>
-    <a:masterClrMapping/>
-  </p:clrMapOvr>
-  <p:timing>
-    <p:tnLst>
-      <p:par>
-        <p:cTn id="1" dur="indefinite" restart="never" nodeType="tmRoot"/>
-      </p:par>
-    </p:tnLst>
-  </p:timing>
-</p:sld>
-</file>
-
-<file path=ppt/slides/slide30.xml><?xml version="1.0" encoding="utf-8"?>
-<p:sld xmlns:a="http://schemas.openxmlformats.org/drawingml/2006/main" xmlns:r="http://schemas.openxmlformats.org/officeDocument/2006/relationships" xmlns:p="http://schemas.openxmlformats.org/presentationml/2006/main">
-  <p:cSld>
-    <p:spTree>
-      <p:nvGrpSpPr>
-        <p:cNvPr id="1" name=""/>
-        <p:cNvGrpSpPr/>
-        <p:nvPr/>
-      </p:nvGrpSpPr>
-      <p:grpSpPr>
-        <a:xfrm>
-          <a:off x="0" y="0"/>
-          <a:ext cx="0" cy="0"/>
-          <a:chOff x="0" y="0"/>
-          <a:chExt cx="0" cy="0"/>
-        </a:xfrm>
-      </p:grpSpPr>
-      <p:sp>
-        <p:nvSpPr>
-          <p:cNvPr id="2" name="Title 1"/>
-          <p:cNvSpPr>
-            <a:spLocks noGrp="1"/>
-          </p:cNvSpPr>
-          <p:nvPr>
-            <p:ph type="title"/>
-          </p:nvPr>
-        </p:nvSpPr>
-        <p:spPr/>
-        <p:txBody>
-          <a:bodyPr/>
-          <a:lstStyle/>
-          <a:p>
-            <a:r>
-              <a:rPr lang="en-US" dirty="0" smtClean="0"/>
-              <a:t>Player </a:t>
-            </a:r>
-            <a:r>
-              <a:rPr lang="en-US" dirty="0"/>
-              <a:t>Test Code</a:t>
-            </a:r>
-          </a:p>
-        </p:txBody>
-      </p:sp>
-      <p:sp>
-        <p:nvSpPr>
-          <p:cNvPr id="3" name="Content Placeholder 2"/>
-          <p:cNvSpPr>
-            <a:spLocks noGrp="1"/>
-          </p:cNvSpPr>
-          <p:nvPr>
-            <p:ph idx="1"/>
-          </p:nvPr>
-        </p:nvSpPr>
-        <p:spPr/>
-        <p:txBody>
-          <a:bodyPr/>
-          <a:lstStyle/>
-          <a:p>
-            <a:r>
-              <a:rPr lang="en-US" sz="1800" dirty="0"/>
-              <a:t>[</a:t>
-            </a:r>
-            <a:r>
-              <a:rPr lang="en-US" sz="1800" dirty="0" err="1"/>
-              <a:t>TestMethod</a:t>
-            </a:r>
-            <a:r>
-              <a:rPr lang="en-US" sz="1800" dirty="0"/>
-              <a:t>]</a:t>
-            </a:r>
-          </a:p>
-          <a:p>
-            <a:r>
-              <a:rPr lang="en-US" sz="1800" dirty="0"/>
-              <a:t>        public void </a:t>
-            </a:r>
-            <a:r>
-              <a:rPr lang="en-US" sz="1800" dirty="0" err="1"/>
-              <a:t>BoundingBox_Test</a:t>
-            </a:r>
-            <a:r>
-              <a:rPr lang="en-US" sz="1800" dirty="0"/>
-              <a:t>()</a:t>
-            </a:r>
-          </a:p>
-          <a:p>
-            <a:r>
-              <a:rPr lang="en-US" sz="1800" dirty="0"/>
-              <a:t>        {</a:t>
-            </a:r>
-          </a:p>
-          <a:p>
-            <a:r>
-              <a:rPr lang="en-US" sz="1800" dirty="0"/>
-              <a:t>            Rectangle r = new Rectangle(11, 12, 72, 16);</a:t>
-            </a:r>
-          </a:p>
-          <a:p>
-            <a:r>
-              <a:rPr lang="en-US" sz="1800" dirty="0"/>
-              <a:t>            </a:t>
-            </a:r>
-            <a:r>
-              <a:rPr lang="en-US" sz="1800" dirty="0" err="1"/>
-              <a:t>testplay.X</a:t>
-            </a:r>
-            <a:r>
-              <a:rPr lang="en-US" sz="1800" dirty="0"/>
-              <a:t> = 11;</a:t>
-            </a:r>
-          </a:p>
-          <a:p>
-            <a:r>
-              <a:rPr lang="en-US" sz="1800" dirty="0"/>
-              <a:t>            </a:t>
-            </a:r>
-            <a:r>
-              <a:rPr lang="en-US" sz="1800" dirty="0" err="1"/>
-              <a:t>testplay.Y</a:t>
-            </a:r>
-            <a:r>
-              <a:rPr lang="en-US" sz="1800" dirty="0"/>
-              <a:t> = 12;</a:t>
-            </a:r>
-          </a:p>
-          <a:p>
-            <a:r>
-              <a:rPr lang="en-US" sz="1800" dirty="0"/>
-              <a:t>            </a:t>
-            </a:r>
-            <a:r>
-              <a:rPr lang="en-US" sz="1800" dirty="0" err="1"/>
-              <a:t>Assert.AreEqual</a:t>
-            </a:r>
-            <a:r>
-              <a:rPr lang="en-US" sz="1800" dirty="0"/>
-              <a:t>(r, </a:t>
-            </a:r>
-            <a:r>
-              <a:rPr lang="en-US" sz="1800" dirty="0" err="1"/>
-              <a:t>testplay.BoundingBox</a:t>
-            </a:r>
-            <a:r>
-              <a:rPr lang="en-US" sz="1800" dirty="0"/>
-              <a:t>);</a:t>
-            </a:r>
-          </a:p>
-          <a:p>
-            <a:r>
-              <a:rPr lang="en-US" sz="1800" dirty="0"/>
-              <a:t>        }</a:t>
-            </a:r>
-          </a:p>
-          <a:p>
-            <a:r>
-              <a:rPr lang="en-US" sz="1800" dirty="0"/>
-              <a:t>        [</a:t>
-            </a:r>
-            <a:r>
-              <a:rPr lang="en-US" sz="1800" dirty="0" err="1"/>
-              <a:t>TestMethod</a:t>
-            </a:r>
-            <a:r>
-              <a:rPr lang="en-US" sz="1800" dirty="0"/>
-              <a:t>]</a:t>
-            </a:r>
-          </a:p>
-          <a:p>
-            <a:r>
-              <a:rPr lang="en-US" sz="1800" dirty="0"/>
-              <a:t>        public void </a:t>
-            </a:r>
-            <a:r>
-              <a:rPr lang="en-US" sz="1800" dirty="0" err="1"/>
-              <a:t>Update_Test</a:t>
-            </a:r>
-            <a:r>
-              <a:rPr lang="en-US" sz="1800" dirty="0"/>
-              <a:t>()</a:t>
-            </a:r>
-          </a:p>
-          <a:p>
-            <a:r>
-              <a:rPr lang="en-US" sz="1800" dirty="0"/>
-              <a:t>        {</a:t>
-            </a:r>
-          </a:p>
-          <a:p>
-            <a:r>
-              <a:rPr lang="en-US" sz="1800" dirty="0"/>
-              <a:t>            </a:t>
-            </a:r>
-            <a:r>
-              <a:rPr lang="en-US" sz="1800" dirty="0" err="1"/>
-              <a:t>testplay.Facing</a:t>
-            </a:r>
-            <a:r>
-              <a:rPr lang="en-US" sz="1800" dirty="0"/>
-              <a:t> = 2;</a:t>
-            </a:r>
-          </a:p>
-          <a:p>
-            <a:r>
-              <a:rPr lang="en-US" sz="1800" dirty="0"/>
-              <a:t>            </a:t>
-            </a:r>
-            <a:r>
-              <a:rPr lang="en-US" sz="1800" dirty="0" err="1"/>
-              <a:t>testplay.Thrusting</a:t>
-            </a:r>
-            <a:r>
-              <a:rPr lang="en-US" sz="1800" dirty="0"/>
-              <a:t> = true;</a:t>
-            </a:r>
-          </a:p>
-          <a:p>
-            <a:r>
-              <a:rPr lang="en-US" sz="1800" dirty="0"/>
-              <a:t>            </a:t>
-            </a:r>
-            <a:r>
-              <a:rPr lang="en-US" sz="1800" dirty="0" err="1"/>
-              <a:t>testplay.Update</a:t>
-            </a:r>
-            <a:r>
-              <a:rPr lang="en-US" sz="1800" dirty="0"/>
-              <a:t>(</a:t>
-            </a:r>
-            <a:r>
-              <a:rPr lang="en-US" sz="1800" dirty="0" err="1"/>
-              <a:t>gameTime</a:t>
-            </a:r>
-            <a:r>
-              <a:rPr lang="en-US" sz="1800" dirty="0" smtClean="0"/>
-              <a:t>);</a:t>
-            </a:r>
-            <a:endParaRPr lang="en-US" sz="1800" dirty="0"/>
-          </a:p>
-          <a:p>
-            <a:r>
-              <a:rPr lang="en-US" sz="1800" dirty="0"/>
-              <a:t>            </a:t>
-            </a:r>
-            <a:r>
-              <a:rPr lang="en-US" sz="1800" dirty="0" err="1"/>
-              <a:t>Assert.IsTrue</a:t>
-            </a:r>
-            <a:r>
-              <a:rPr lang="en-US" sz="1800" dirty="0"/>
-              <a:t>(3 == </a:t>
-            </a:r>
-            <a:r>
-              <a:rPr lang="en-US" sz="1800" dirty="0" err="1"/>
-              <a:t>testplay.asSprite.Frame</a:t>
-            </a:r>
-            <a:r>
-              <a:rPr lang="en-US" sz="1800" dirty="0"/>
-              <a:t>);</a:t>
-            </a:r>
-          </a:p>
-          <a:p>
-            <a:r>
-              <a:rPr lang="en-US" sz="1800" dirty="0"/>
-              <a:t>        }</a:t>
-            </a:r>
-          </a:p>
-          <a:p>
-            <a:pPr marL="0" indent="0">
-              <a:buNone/>
-            </a:pPr>
-            <a:endParaRPr lang="en-US" sz="1800" dirty="0"/>
-          </a:p>
-        </p:txBody>
-      </p:sp>
-    </p:spTree>
-    <p:extLst>
-      <p:ext uri="{BB962C8B-B14F-4D97-AF65-F5344CB8AC3E}">
-        <p14:creationId xmlns:p14="http://schemas.microsoft.com/office/powerpoint/2010/main" val="4263394673"/>
-      </p:ext>
-    </p:extLst>
-  </p:cSld>
-  <p:clrMapOvr>
-    <a:masterClrMapping/>
-  </p:clrMapOvr>
-  <p:timing>
-    <p:tnLst>
-      <p:par>
-        <p:cTn id="1" dur="indefinite" restart="never" nodeType="tmRoot"/>
-      </p:par>
-    </p:tnLst>
-  </p:timing>
-</p:sld>
-</file>
-
-<file path=ppt/slides/slide31.xml><?xml version="1.0" encoding="utf-8"?>
+<file path=ppt/slides/slide29.xml><?xml version="1.0" encoding="utf-8"?>
 <p:sld xmlns:a="http://schemas.openxmlformats.org/drawingml/2006/main" xmlns:r="http://schemas.openxmlformats.org/officeDocument/2006/relationships" xmlns:p="http://schemas.openxmlformats.org/presentationml/2006/main">
   <p:cSld>
     <p:spTree>
@@ -7944,7 +7315,7 @@
 </p:sld>
 </file>
 
-<file path=ppt/slides/slide32.xml><?xml version="1.0" encoding="utf-8"?>
+<file path=ppt/slides/slide3.xml><?xml version="1.0" encoding="utf-8"?>
 <p:sld xmlns:a="http://schemas.openxmlformats.org/drawingml/2006/main" xmlns:r="http://schemas.openxmlformats.org/officeDocument/2006/relationships" xmlns:p="http://schemas.openxmlformats.org/presentationml/2006/main">
   <p:cSld>
     <p:spTree>
@@ -7978,7 +7349,7 @@
           <a:p>
             <a:r>
               <a:rPr lang="en-US" dirty="0" smtClean="0"/>
-              <a:t>Status of the Game</a:t>
+              <a:t>User Stories for 1.0 Part 2</a:t>
             </a:r>
             <a:endParaRPr lang="en-US" dirty="0"/>
           </a:p>
@@ -8000,30 +7371,41 @@
           <a:lstStyle/>
           <a:p>
             <a:r>
-              <a:rPr lang="en-US" dirty="0" smtClean="0"/>
-              <a:t>At this point in time there is a menu interface that will work regardless of any changes made to </a:t>
-            </a:r>
-            <a:r>
-              <a:rPr lang="en-US" dirty="0" err="1" smtClean="0"/>
-              <a:t>gameplay</a:t>
-            </a:r>
-            <a:r>
-              <a:rPr lang="en-US" dirty="0" smtClean="0"/>
-              <a:t>.</a:t>
-            </a:r>
-          </a:p>
-          <a:p>
-            <a:r>
-              <a:rPr lang="en-US" dirty="0" smtClean="0"/>
-              <a:t>The instructions, and high score screens are currently blank.</a:t>
-            </a:r>
-          </a:p>
-          <a:p>
-            <a:r>
-              <a:rPr lang="en-US" dirty="0" smtClean="0"/>
-              <a:t>The game loads the first level but lacks the ability for the ship’s basic functions.</a:t>
-            </a:r>
-            <a:endParaRPr lang="en-US" dirty="0"/>
+              <a:rPr lang="en-US" sz="2800" b="1" dirty="0" smtClean="0"/>
+              <a:t>As a user who clicks on the menu option, 'scores,' I want to be presented with a list of the highest scores.</a:t>
+            </a:r>
+          </a:p>
+          <a:p>
+            <a:r>
+              <a:rPr lang="en-US" sz="2800" b="1" dirty="0" smtClean="0"/>
+              <a:t>As a user who clicks on the menu option, 'Quit,' I want to close the game.</a:t>
+            </a:r>
+          </a:p>
+          <a:p>
+            <a:r>
+              <a:rPr lang="en-US" sz="2800" b="1" dirty="0" smtClean="0"/>
+              <a:t>As a user who clicks on the menu option, 'instructions,' I want to be presented with the instructions to play the game.</a:t>
+            </a:r>
+          </a:p>
+          <a:p>
+            <a:r>
+              <a:rPr lang="en-US" sz="2800" b="1" dirty="0" smtClean="0"/>
+              <a:t>As a user who clicks on the </a:t>
+            </a:r>
+            <a:r>
+              <a:rPr lang="en-US" sz="2800" b="1" dirty="0" err="1" smtClean="0"/>
+              <a:t>mnu</a:t>
+            </a:r>
+            <a:r>
+              <a:rPr lang="en-US" sz="2800" b="1" dirty="0" smtClean="0"/>
+              <a:t> option, ‘credits,’ I want to be presented with the credits for the game</a:t>
+            </a:r>
+          </a:p>
+          <a:p>
+            <a:endParaRPr lang="en-US" sz="2800" dirty="0" smtClean="0"/>
+          </a:p>
+          <a:p>
+            <a:endParaRPr lang="en-US" sz="2800" dirty="0"/>
           </a:p>
         </p:txBody>
       </p:sp>
@@ -8042,7 +7424,7 @@
 </p:sld>
 </file>
 
-<file path=ppt/slides/slide33.xml><?xml version="1.0" encoding="utf-8"?>
+<file path=ppt/slides/slide30.xml><?xml version="1.0" encoding="utf-8"?>
 <p:sld xmlns:a="http://schemas.openxmlformats.org/drawingml/2006/main" xmlns:r="http://schemas.openxmlformats.org/officeDocument/2006/relationships" xmlns:p="http://schemas.openxmlformats.org/presentationml/2006/main">
   <p:cSld>
     <p:spTree>
@@ -8076,7 +7458,7 @@
           <a:p>
             <a:r>
               <a:rPr lang="en-US" dirty="0" smtClean="0"/>
-              <a:t>Plans for version 1.1</a:t>
+              <a:t>Status of the Game</a:t>
             </a:r>
             <a:endParaRPr lang="en-US" dirty="0"/>
           </a:p>
@@ -8099,31 +7481,27 @@
           <a:p>
             <a:r>
               <a:rPr lang="en-US" dirty="0" smtClean="0"/>
-              <a:t>Give the ship the ability to move up, down, right and left via the direction keys or (WASD).</a:t>
-            </a:r>
-          </a:p>
-          <a:p>
+              <a:t>At this point in time there is a menu interface that will work regardless of any changes made to </a:t>
+            </a:r>
+            <a:r>
+              <a:rPr lang="en-US" dirty="0" err="1" smtClean="0"/>
+              <a:t>gameplay</a:t>
+            </a:r>
             <a:r>
               <a:rPr lang="en-US" dirty="0" smtClean="0"/>
-              <a:t>Give the ship the ability to shoot a laser.</a:t>
+              <a:t>.</a:t>
             </a:r>
           </a:p>
           <a:p>
             <a:r>
               <a:rPr lang="en-US" dirty="0" smtClean="0"/>
-              <a:t>Have the background automatically move at a set pace</a:t>
+              <a:t>The instructions, and high score screens are currently blank.</a:t>
             </a:r>
           </a:p>
           <a:p>
             <a:r>
               <a:rPr lang="en-US" dirty="0" smtClean="0"/>
-              <a:t>Implement music in the main menus</a:t>
-            </a:r>
-          </a:p>
-          <a:p>
-            <a:r>
-              <a:rPr lang="en-US" dirty="0" smtClean="0"/>
-              <a:t>Implement the use of either a text file, or a graphic window that can scroll, to display the instructions.</a:t>
+              <a:t>The game loads the first level but lacks the ability for the ship’s basic functions.</a:t>
             </a:r>
             <a:endParaRPr lang="en-US" dirty="0"/>
           </a:p>
@@ -8144,7 +7522,109 @@
 </p:sld>
 </file>
 
-<file path=ppt/slides/slide34.xml><?xml version="1.0" encoding="utf-8"?>
+<file path=ppt/slides/slide31.xml><?xml version="1.0" encoding="utf-8"?>
+<p:sld xmlns:a="http://schemas.openxmlformats.org/drawingml/2006/main" xmlns:r="http://schemas.openxmlformats.org/officeDocument/2006/relationships" xmlns:p="http://schemas.openxmlformats.org/presentationml/2006/main">
+  <p:cSld>
+    <p:spTree>
+      <p:nvGrpSpPr>
+        <p:cNvPr id="1" name=""/>
+        <p:cNvGrpSpPr/>
+        <p:nvPr/>
+      </p:nvGrpSpPr>
+      <p:grpSpPr>
+        <a:xfrm>
+          <a:off x="0" y="0"/>
+          <a:ext cx="0" cy="0"/>
+          <a:chOff x="0" y="0"/>
+          <a:chExt cx="0" cy="0"/>
+        </a:xfrm>
+      </p:grpSpPr>
+      <p:sp>
+        <p:nvSpPr>
+          <p:cNvPr id="2" name="Title 1"/>
+          <p:cNvSpPr>
+            <a:spLocks noGrp="1"/>
+          </p:cNvSpPr>
+          <p:nvPr>
+            <p:ph type="title"/>
+          </p:nvPr>
+        </p:nvSpPr>
+        <p:spPr/>
+        <p:txBody>
+          <a:bodyPr/>
+          <a:lstStyle/>
+          <a:p>
+            <a:r>
+              <a:rPr lang="en-US" dirty="0" smtClean="0"/>
+              <a:t>Plans for version 1.1</a:t>
+            </a:r>
+            <a:endParaRPr lang="en-US" dirty="0"/>
+          </a:p>
+        </p:txBody>
+      </p:sp>
+      <p:sp>
+        <p:nvSpPr>
+          <p:cNvPr id="3" name="Content Placeholder 2"/>
+          <p:cNvSpPr>
+            <a:spLocks noGrp="1"/>
+          </p:cNvSpPr>
+          <p:nvPr>
+            <p:ph idx="1"/>
+          </p:nvPr>
+        </p:nvSpPr>
+        <p:spPr/>
+        <p:txBody>
+          <a:bodyPr/>
+          <a:lstStyle/>
+          <a:p>
+            <a:r>
+              <a:rPr lang="en-US" dirty="0" smtClean="0"/>
+              <a:t>Give the ship the ability to move up, down, right and left via the direction keys or (WASD).</a:t>
+            </a:r>
+          </a:p>
+          <a:p>
+            <a:r>
+              <a:rPr lang="en-US" dirty="0" smtClean="0"/>
+              <a:t>Give the ship the ability to shoot a laser.</a:t>
+            </a:r>
+          </a:p>
+          <a:p>
+            <a:r>
+              <a:rPr lang="en-US" dirty="0" smtClean="0"/>
+              <a:t>Have the background automatically move at a set pace</a:t>
+            </a:r>
+          </a:p>
+          <a:p>
+            <a:r>
+              <a:rPr lang="en-US" dirty="0" smtClean="0"/>
+              <a:t>Implement music in the main menus</a:t>
+            </a:r>
+          </a:p>
+          <a:p>
+            <a:r>
+              <a:rPr lang="en-US" dirty="0" smtClean="0"/>
+              <a:t>Implement the use of either a text file, or a graphic window that can scroll, to display the instructions.</a:t>
+            </a:r>
+            <a:endParaRPr lang="en-US" dirty="0"/>
+          </a:p>
+        </p:txBody>
+      </p:sp>
+    </p:spTree>
+  </p:cSld>
+  <p:clrMapOvr>
+    <a:masterClrMapping/>
+  </p:clrMapOvr>
+  <p:timing>
+    <p:tnLst>
+      <p:par>
+        <p:cTn id="1" dur="indefinite" restart="never" nodeType="tmRoot"/>
+      </p:par>
+    </p:tnLst>
+  </p:timing>
+</p:sld>
+</file>
+
+<file path=ppt/slides/slide32.xml><?xml version="1.0" encoding="utf-8"?>
 <p:sld xmlns:a="http://schemas.openxmlformats.org/drawingml/2006/main" xmlns:r="http://schemas.openxmlformats.org/officeDocument/2006/relationships" xmlns:p="http://schemas.openxmlformats.org/presentationml/2006/main">
   <p:cSld>
     <p:spTree>

</xml_diff>